<commit_message>
hausarbeit und info update (info fertig)
</commit_message>
<xml_diff>
--- a/2.Semester/Informationen/Präsi_BTA_KIRA_B50_Simon_Feldmann.pptx
+++ b/2.Semester/Informationen/Präsi_BTA_KIRA_B50_Simon_Feldmann.pptx
@@ -6,15 +6,14 @@
   </p:sldMasterIdLst>
   <p:sldIdLst>
     <p:sldId id="256" r:id="rId2"/>
-    <p:sldId id="257" r:id="rId3"/>
-    <p:sldId id="258" r:id="rId4"/>
-    <p:sldId id="259" r:id="rId5"/>
-    <p:sldId id="260" r:id="rId6"/>
-    <p:sldId id="261" r:id="rId7"/>
-    <p:sldId id="262" r:id="rId8"/>
-    <p:sldId id="263" r:id="rId9"/>
-    <p:sldId id="264" r:id="rId10"/>
-    <p:sldId id="265" r:id="rId11"/>
+    <p:sldId id="258" r:id="rId3"/>
+    <p:sldId id="259" r:id="rId4"/>
+    <p:sldId id="260" r:id="rId5"/>
+    <p:sldId id="261" r:id="rId6"/>
+    <p:sldId id="262" r:id="rId7"/>
+    <p:sldId id="263" r:id="rId8"/>
+    <p:sldId id="264" r:id="rId9"/>
+    <p:sldId id="265" r:id="rId10"/>
   </p:sldIdLst>
   <p:sldSz cx="18288000" cy="10287000"/>
   <p:notesSz cx="7559675" cy="10691813"/>
@@ -113,6 +112,11 @@
       </a:defRPr>
     </a:lvl9pPr>
   </p:defaultTextStyle>
+  <p:extLst>
+    <p:ext uri="{EFAFB233-063F-42B5-8137-9DF3F51BA10A}">
+      <p15:sldGuideLst xmlns:p15="http://schemas.microsoft.com/office/powerpoint/2012/main"/>
+    </p:ext>
+  </p:extLst>
 </p:presentation>
 </file>
 
@@ -3548,7 +3552,7 @@
           </a:bodyPr>
           <a:lstStyle/>
           <a:p>
-            <a:endParaRPr lang="de-DE" sz="1800" b="0" strike="noStrike" spc="-1">
+            <a:endParaRPr lang="de-DE" sz="1800" b="0" strike="noStrike" spc="-1" dirty="0">
               <a:solidFill>
                 <a:srgbClr val="000000"/>
               </a:solidFill>
@@ -3627,7 +3631,7 @@
           </a:bodyPr>
           <a:lstStyle/>
           <a:p>
-            <a:endParaRPr lang="de-DE" sz="1800" b="0" strike="noStrike" spc="-1">
+            <a:endParaRPr lang="de-DE" sz="1800" b="0" strike="noStrike" spc="-1" dirty="0">
               <a:solidFill>
                 <a:srgbClr val="000000"/>
               </a:solidFill>
@@ -3706,7 +3710,7 @@
           </a:bodyPr>
           <a:lstStyle/>
           <a:p>
-            <a:endParaRPr lang="de-DE" sz="1800" b="0" strike="noStrike" spc="-1">
+            <a:endParaRPr lang="de-DE" sz="1800" b="0" strike="noStrike" spc="-1" dirty="0">
               <a:solidFill>
                 <a:srgbClr val="000000"/>
               </a:solidFill>
@@ -3723,10 +3727,10 @@
         </p:nvGrpSpPr>
         <p:grpSpPr>
           <a:xfrm>
-            <a:off x="1728720" y="4889520"/>
-            <a:ext cx="11214360" cy="3292920"/>
+            <a:off x="1728720" y="4889519"/>
+            <a:ext cx="11214360" cy="2777483"/>
             <a:chOff x="1728720" y="4889520"/>
-            <a:chExt cx="11214360" cy="3292920"/>
+            <a:chExt cx="11214360" cy="2761173"/>
           </a:xfrm>
         </p:grpSpPr>
         <p:sp>
@@ -3772,15 +3776,15 @@
                 </a:lnSpc>
               </a:pPr>
               <a:r>
-                <a:rPr lang="en-US" sz="11500" b="0" strike="noStrike" spc="-1">
+                <a:rPr lang="en-US" sz="11500" b="0" strike="noStrike" spc="-1" dirty="0">
                   <a:solidFill>
                     <a:srgbClr val="F7F4FA"/>
                   </a:solidFill>
                   <a:latin typeface="Codec Pro"/>
                 </a:rPr>
-                <a:t>Pitch Deck</a:t>
+                <a:t>KIRA B50</a:t>
               </a:r>
-              <a:endParaRPr lang="de-DE" sz="11500" b="0" strike="noStrike" spc="-1">
+              <a:endParaRPr lang="de-DE" sz="11500" b="0" strike="noStrike" spc="-1" dirty="0">
                 <a:solidFill>
                   <a:srgbClr val="000000"/>
                 </a:solidFill>
@@ -3798,7 +3802,7 @@
           <p:spPr>
             <a:xfrm>
               <a:off x="1728720" y="7186320"/>
-              <a:ext cx="11214360" cy="996120"/>
+              <a:ext cx="11214360" cy="464373"/>
             </a:xfrm>
             <a:prstGeom prst="rect">
               <a:avLst/>
@@ -3832,15 +3836,51 @@
                 </a:lnSpc>
               </a:pPr>
               <a:r>
-                <a:rPr lang="en-US" sz="2800" b="0" strike="noStrike" spc="-1">
+                <a:rPr lang="en-US" sz="2800" b="0" strike="noStrike" spc="-1" dirty="0" err="1">
                   <a:solidFill>
                     <a:srgbClr val="F7F4FA"/>
                   </a:solidFill>
                   <a:latin typeface="Codec Pro"/>
                 </a:rPr>
-                <a:t>Trage deinen Firmennamen hier oben ein und eine interessante Zusammenfassung darüber, was deine Firma macht.</a:t>
+                <a:t>Text,Bild</a:t>
               </a:r>
-              <a:endParaRPr lang="de-DE" sz="2800" b="0" strike="noStrike" spc="-1">
+              <a:r>
+                <a:rPr lang="en-US" sz="2800" b="0" strike="noStrike" spc="-1" dirty="0">
+                  <a:solidFill>
+                    <a:srgbClr val="F7F4FA"/>
+                  </a:solidFill>
+                  <a:latin typeface="Codec Pro"/>
+                </a:rPr>
+                <a:t> und </a:t>
+              </a:r>
+              <a:r>
+                <a:rPr lang="en-US" sz="2800" b="0" strike="noStrike" spc="-1" dirty="0" err="1">
+                  <a:solidFill>
+                    <a:srgbClr val="F7F4FA"/>
+                  </a:solidFill>
+                  <a:latin typeface="Codec Pro"/>
+                </a:rPr>
+                <a:t>Strukut</a:t>
+              </a:r>
+              <a:r>
+                <a:rPr lang="en-US" sz="2800" b="0" strike="noStrike" spc="-1" dirty="0">
+                  <a:solidFill>
+                    <a:srgbClr val="F7F4FA"/>
+                  </a:solidFill>
+                  <a:latin typeface="Codec Pro"/>
+                </a:rPr>
+                <a:t> der </a:t>
+              </a:r>
+              <a:r>
+                <a:rPr lang="en-US" sz="2800" b="0" strike="noStrike" spc="-1" dirty="0" err="1">
+                  <a:solidFill>
+                    <a:srgbClr val="F7F4FA"/>
+                  </a:solidFill>
+                  <a:latin typeface="Codec Pro"/>
+                </a:rPr>
+                <a:t>Anleitung</a:t>
+              </a:r>
+              <a:endParaRPr lang="de-DE" sz="2800" b="0" strike="noStrike" spc="-1" dirty="0">
                 <a:solidFill>
                   <a:srgbClr val="000000"/>
                 </a:solidFill>
@@ -3859,7 +3899,7 @@
         <p:spPr>
           <a:xfrm>
             <a:off x="1728720" y="9012600"/>
-            <a:ext cx="4370400" cy="284760"/>
+            <a:ext cx="4370400" cy="264111"/>
           </a:xfrm>
           <a:prstGeom prst="rect">
             <a:avLst/>
@@ -3893,15 +3933,15 @@
               </a:lnSpc>
             </a:pPr>
             <a:r>
-              <a:rPr lang="en-US" sz="1600" b="0" strike="noStrike" spc="-1">
+              <a:rPr lang="en-US" sz="1600" b="0" strike="noStrike" spc="-1" dirty="0">
                 <a:solidFill>
                   <a:srgbClr val="F7F4FA"/>
                 </a:solidFill>
                 <a:latin typeface="Codec Pro"/>
               </a:rPr>
-              <a:t>Jede Stadt, 24.Oktober 2024</a:t>
-            </a:r>
-            <a:endParaRPr lang="de-DE" sz="1600" b="0" strike="noStrike" spc="-1">
+              <a:t>Aalen, 25.06.2024</a:t>
+            </a:r>
+            <a:endParaRPr lang="de-DE" sz="1600" b="0" strike="noStrike" spc="-1" dirty="0">
               <a:solidFill>
                 <a:srgbClr val="000000"/>
               </a:solidFill>
@@ -3919,7 +3959,7 @@
         <p:spPr>
           <a:xfrm>
             <a:off x="1728720" y="9371520"/>
-            <a:ext cx="4370400" cy="284760"/>
+            <a:ext cx="4370400" cy="264111"/>
           </a:xfrm>
           <a:prstGeom prst="rect">
             <a:avLst/>
@@ -3953,15 +3993,15 @@
               </a:lnSpc>
             </a:pPr>
             <a:r>
-              <a:rPr lang="en-US" sz="1600" b="0" strike="noStrike" spc="-1">
+              <a:rPr lang="en-US" sz="1600" b="0" strike="noStrike" spc="-1" dirty="0">
                 <a:solidFill>
                   <a:srgbClr val="F7F4FA"/>
                 </a:solidFill>
                 <a:latin typeface="Codec Pro"/>
               </a:rPr>
-              <a:t>Streng vertraulich</a:t>
-            </a:r>
-            <a:endParaRPr lang="de-DE" sz="1600" b="0" strike="noStrike" spc="-1">
+              <a:t>Simon Feldmann</a:t>
+            </a:r>
+            <a:endParaRPr lang="de-DE" sz="1600" b="0" strike="noStrike" spc="-1" dirty="0">
               <a:solidFill>
                 <a:srgbClr val="000000"/>
               </a:solidFill>
@@ -3978,7 +4018,7 @@
 </p:sld>
 </file>
 
-<file path=ppt/slides/slide10.xml><?xml version="1.0" encoding="utf-8"?>
+<file path=ppt/slides/slide2.xml><?xml version="1.0" encoding="utf-8"?>
 <p:sld xmlns:a="http://schemas.openxmlformats.org/drawingml/2006/main" xmlns:r="http://schemas.openxmlformats.org/officeDocument/2006/relationships" xmlns:p="http://schemas.openxmlformats.org/presentationml/2006/main">
   <p:cSld>
     <p:bg>
@@ -4005,7 +4045,7 @@
       </p:grpSpPr>
       <p:sp>
         <p:nvSpPr>
-          <p:cNvPr id="106" name="AutoShape 9"/>
+          <p:cNvPr id="55" name="AutoShape 1"/>
           <p:cNvSpPr/>
           <p:nvPr/>
         </p:nvSpPr>
@@ -4053,7 +4093,7 @@
       </p:sp>
       <p:sp>
         <p:nvSpPr>
-          <p:cNvPr id="107" name="Freeform 18"/>
+          <p:cNvPr id="56" name="Freeform 1"/>
           <p:cNvSpPr/>
           <p:nvPr/>
         </p:nvSpPr>
@@ -4132,7 +4172,7 @@
       </p:sp>
       <p:sp>
         <p:nvSpPr>
-          <p:cNvPr id="108" name="Freeform 19"/>
+          <p:cNvPr id="57" name="Freeform 5"/>
           <p:cNvSpPr/>
           <p:nvPr/>
         </p:nvSpPr>
@@ -4211,7 +4251,7 @@
       </p:sp>
       <p:sp>
         <p:nvSpPr>
-          <p:cNvPr id="109" name="TextBox 26"/>
+          <p:cNvPr id="58" name="TextBox 1"/>
           <p:cNvSpPr/>
           <p:nvPr/>
         </p:nvSpPr>
@@ -4258,7 +4298,7 @@
                 </a:solidFill>
                 <a:latin typeface="Codec Pro"/>
               </a:rPr>
-              <a:t>Wie kann man es besser machen</a:t>
+              <a:t>→ weglassen</a:t>
             </a:r>
             <a:endParaRPr lang="de-DE" sz="1800" b="0" strike="noStrike" spc="-1">
               <a:solidFill>
@@ -4271,7 +4311,7 @@
       </p:sp>
       <p:sp>
         <p:nvSpPr>
-          <p:cNvPr id="110" name="TextBox 27"/>
+          <p:cNvPr id="59" name="TextBox 2"/>
           <p:cNvSpPr/>
           <p:nvPr/>
         </p:nvSpPr>
@@ -4312,15 +4352,24 @@
               </a:lnSpc>
             </a:pPr>
             <a:r>
-              <a:rPr lang="en-US" sz="8000" b="0" strike="noStrike" spc="-1">
-                <a:solidFill>
-                  <a:srgbClr val="17161C"/>
-                </a:solidFill>
-                <a:latin typeface="Codec Pro"/>
-              </a:rPr>
-              <a:t>Textfehler</a:t>
-            </a:r>
-            <a:endParaRPr lang="de-DE" sz="8000" b="0" strike="noStrike" spc="-1">
+              <a:rPr lang="en-US" sz="8000" b="0" strike="noStrike" spc="-1" dirty="0" err="1">
+                <a:solidFill>
+                  <a:srgbClr val="17161C"/>
+                </a:solidFill>
+                <a:latin typeface="Codec Pro"/>
+              </a:rPr>
+              <a:t>Struktur</a:t>
+            </a:r>
+            <a:r>
+              <a:rPr lang="en-US" sz="8000" b="0" strike="noStrike" spc="-1" dirty="0">
+                <a:solidFill>
+                  <a:srgbClr val="17161C"/>
+                </a:solidFill>
+                <a:latin typeface="Codec Pro"/>
+              </a:rPr>
+              <a:t> </a:t>
+            </a:r>
+            <a:endParaRPr lang="de-DE" sz="8000" b="0" strike="noStrike" spc="-1" dirty="0">
               <a:solidFill>
                 <a:srgbClr val="000000"/>
               </a:solidFill>
@@ -4331,7 +4380,7 @@
       </p:sp>
       <p:sp>
         <p:nvSpPr>
-          <p:cNvPr id="111" name="TextBox 28"/>
+          <p:cNvPr id="60" name="TextBox 3"/>
           <p:cNvSpPr/>
           <p:nvPr/>
         </p:nvSpPr>
@@ -4372,15 +4421,114 @@
               </a:lnSpc>
             </a:pPr>
             <a:r>
-              <a:rPr lang="en-US" sz="2400" b="0" strike="noStrike" spc="-1">
-                <a:solidFill>
-                  <a:srgbClr val="17161C"/>
-                </a:solidFill>
-                <a:latin typeface="Codec Pro"/>
-              </a:rPr>
-              <a:t>Beschreibung was falsch gelaufen ist</a:t>
-            </a:r>
-            <a:endParaRPr lang="de-DE" sz="2400" b="0" strike="noStrike" spc="-1">
+              <a:rPr lang="en-US" sz="2400" b="0" strike="noStrike" spc="-1" dirty="0">
+                <a:solidFill>
+                  <a:srgbClr val="17161C"/>
+                </a:solidFill>
+                <a:latin typeface="Codec Pro"/>
+              </a:rPr>
+              <a:t>1. </a:t>
+            </a:r>
+            <a:r>
+              <a:rPr lang="en-US" sz="2400" b="0" strike="noStrike" spc="-1" dirty="0" err="1">
+                <a:solidFill>
+                  <a:srgbClr val="17161C"/>
+                </a:solidFill>
+                <a:latin typeface="Codec Pro"/>
+              </a:rPr>
+              <a:t>erfolgt</a:t>
+            </a:r>
+            <a:r>
+              <a:rPr lang="en-US" sz="2400" b="0" strike="noStrike" spc="-1" dirty="0">
+                <a:solidFill>
+                  <a:srgbClr val="17161C"/>
+                </a:solidFill>
+                <a:latin typeface="Codec Pro"/>
+              </a:rPr>
+              <a:t> </a:t>
+            </a:r>
+            <a:r>
+              <a:rPr lang="en-US" sz="2400" b="0" strike="noStrike" spc="-1" dirty="0" err="1">
+                <a:solidFill>
+                  <a:srgbClr val="17161C"/>
+                </a:solidFill>
+                <a:latin typeface="Codec Pro"/>
+              </a:rPr>
+              <a:t>nur</a:t>
+            </a:r>
+            <a:r>
+              <a:rPr lang="en-US" sz="2400" b="0" strike="noStrike" spc="-1" dirty="0">
+                <a:solidFill>
+                  <a:srgbClr val="17161C"/>
+                </a:solidFill>
+                <a:latin typeface="Codec Pro"/>
+              </a:rPr>
+              <a:t> </a:t>
+            </a:r>
+            <a:r>
+              <a:rPr lang="en-US" sz="2400" b="0" strike="noStrike" spc="-1" dirty="0" err="1">
+                <a:solidFill>
+                  <a:srgbClr val="17161C"/>
+                </a:solidFill>
+                <a:latin typeface="Codec Pro"/>
+              </a:rPr>
+              <a:t>wenn</a:t>
+            </a:r>
+            <a:r>
+              <a:rPr lang="en-US" sz="2400" b="0" strike="noStrike" spc="-1" dirty="0">
+                <a:solidFill>
+                  <a:srgbClr val="17161C"/>
+                </a:solidFill>
+                <a:latin typeface="Codec Pro"/>
+              </a:rPr>
+              <a:t> </a:t>
+            </a:r>
+            <a:r>
+              <a:rPr lang="en-US" sz="2400" b="0" strike="noStrike" spc="-1" dirty="0" err="1">
+                <a:solidFill>
+                  <a:srgbClr val="17161C"/>
+                </a:solidFill>
+                <a:latin typeface="Codec Pro"/>
+              </a:rPr>
+              <a:t>Aufzählung</a:t>
+            </a:r>
+            <a:r>
+              <a:rPr lang="en-US" sz="2400" b="0" strike="noStrike" spc="-1" dirty="0">
+                <a:solidFill>
+                  <a:srgbClr val="17161C"/>
+                </a:solidFill>
+                <a:latin typeface="Codec Pro"/>
+              </a:rPr>
+              <a:t> </a:t>
+            </a:r>
+            <a:r>
+              <a:rPr lang="en-US" sz="2400" b="0" strike="noStrike" spc="-1" dirty="0" err="1">
+                <a:solidFill>
+                  <a:srgbClr val="17161C"/>
+                </a:solidFill>
+                <a:latin typeface="Codec Pro"/>
+              </a:rPr>
+              <a:t>mit</a:t>
+            </a:r>
+            <a:r>
+              <a:rPr lang="en-US" sz="2400" b="0" strike="noStrike" spc="-1" dirty="0">
+                <a:solidFill>
+                  <a:srgbClr val="17161C"/>
+                </a:solidFill>
+                <a:latin typeface="Codec Pro"/>
+              </a:rPr>
+              <a:t> 2. </a:t>
+            </a:r>
+            <a:r>
+              <a:rPr lang="en-US" sz="2400" b="0" strike="noStrike" spc="-1" dirty="0" err="1">
+                <a:solidFill>
+                  <a:srgbClr val="17161C"/>
+                </a:solidFill>
+                <a:latin typeface="Codec Pro"/>
+              </a:rPr>
+              <a:t>erfolgt</a:t>
+            </a:r>
+            <a:endParaRPr lang="de-DE" sz="2400" b="0" strike="noStrike" spc="-1" dirty="0">
               <a:solidFill>
                 <a:srgbClr val="000000"/>
               </a:solidFill>
@@ -4391,7 +4539,7 @@
       </p:sp>
       <p:pic>
         <p:nvPicPr>
-          <p:cNvPr id="112" name="Grafik 111"/>
+          <p:cNvPr id="61" name="Grafik 60"/>
           <p:cNvPicPr/>
           <p:nvPr/>
         </p:nvPicPr>
@@ -4401,15 +4549,24 @@
         </p:blipFill>
         <p:spPr>
           <a:xfrm>
-            <a:off x="1367640" y="4860000"/>
-            <a:ext cx="6732360" cy="3603960"/>
+            <a:off x="540000" y="4680000"/>
+            <a:ext cx="9540000" cy="4709880"/>
           </a:xfrm>
           <a:prstGeom prst="rect">
             <a:avLst/>
           </a:prstGeom>
           <a:ln w="0">
-            <a:noFill/>
-          </a:ln>
+            <a:solidFill>
+              <a:schemeClr val="tx1"/>
+            </a:solidFill>
+          </a:ln>
+          <a:effectLst>
+            <a:outerShdw blurRad="50800" dist="38100" dir="2700000" algn="tl" rotWithShape="0">
+              <a:prstClr val="black">
+                <a:alpha val="40000"/>
+              </a:prstClr>
+            </a:outerShdw>
+          </a:effectLst>
         </p:spPr>
       </p:pic>
     </p:spTree>
@@ -4420,7 +4577,7 @@
 </p:sld>
 </file>
 
-<file path=ppt/slides/slide2.xml><?xml version="1.0" encoding="utf-8"?>
+<file path=ppt/slides/slide3.xml><?xml version="1.0" encoding="utf-8"?>
 <p:sld xmlns:a="http://schemas.openxmlformats.org/drawingml/2006/main" xmlns:r="http://schemas.openxmlformats.org/officeDocument/2006/relationships" xmlns:p="http://schemas.openxmlformats.org/presentationml/2006/main">
   <p:cSld>
     <p:bg>
@@ -4447,7 +4604,7 @@
       </p:grpSpPr>
       <p:sp>
         <p:nvSpPr>
-          <p:cNvPr id="49" name="AutoShape 2"/>
+          <p:cNvPr id="62" name="AutoShape 3"/>
           <p:cNvSpPr/>
           <p:nvPr/>
         </p:nvSpPr>
@@ -4484,7 +4641,7 @@
           </a:bodyPr>
           <a:lstStyle/>
           <a:p>
-            <a:endParaRPr lang="de-DE" sz="1800" b="0" strike="noStrike" spc="-1">
+            <a:endParaRPr lang="de-DE" sz="1800" b="0" strike="noStrike" spc="-1" dirty="0">
               <a:solidFill>
                 <a:srgbClr val="000000"/>
               </a:solidFill>
@@ -4495,13 +4652,13 @@
       </p:sp>
       <p:sp>
         <p:nvSpPr>
-          <p:cNvPr id="50" name="Freeform 3"/>
+          <p:cNvPr id="63" name="Freeform 6"/>
           <p:cNvSpPr/>
           <p:nvPr/>
         </p:nvSpPr>
         <p:spPr>
           <a:xfrm>
-            <a:off x="11773440" y="-714240"/>
+            <a:off x="11750760" y="-672677"/>
             <a:ext cx="12363120" cy="12250800"/>
           </a:xfrm>
           <a:custGeom>
@@ -4563,7 +4720,7 @@
           </a:bodyPr>
           <a:lstStyle/>
           <a:p>
-            <a:endParaRPr lang="de-DE" sz="1800" b="0" strike="noStrike" spc="-1">
+            <a:endParaRPr lang="de-DE" sz="1800" b="0" strike="noStrike" spc="-1" dirty="0">
               <a:solidFill>
                 <a:srgbClr val="000000"/>
               </a:solidFill>
@@ -4574,7 +4731,7 @@
       </p:sp>
       <p:sp>
         <p:nvSpPr>
-          <p:cNvPr id="51" name="Freeform 4"/>
+          <p:cNvPr id="64" name="Freeform 7"/>
           <p:cNvSpPr/>
           <p:nvPr/>
         </p:nvSpPr>
@@ -4642,7 +4799,7 @@
           </a:bodyPr>
           <a:lstStyle/>
           <a:p>
-            <a:endParaRPr lang="de-DE" sz="1800" b="0" strike="noStrike" spc="-1">
+            <a:endParaRPr lang="de-DE" sz="1800" b="0" strike="noStrike" spc="-1" dirty="0">
               <a:solidFill>
                 <a:srgbClr val="000000"/>
               </a:solidFill>
@@ -4653,14 +4810,14 @@
       </p:sp>
       <p:sp>
         <p:nvSpPr>
-          <p:cNvPr id="52" name="TextBox 6"/>
+          <p:cNvPr id="65" name="TextBox 4"/>
           <p:cNvSpPr/>
           <p:nvPr/>
         </p:nvSpPr>
         <p:spPr>
           <a:xfrm>
             <a:off x="1367640" y="3240000"/>
-            <a:ext cx="5652360" cy="320400"/>
+            <a:ext cx="5652360" cy="639720"/>
           </a:xfrm>
           <a:prstGeom prst="rect">
             <a:avLst/>
@@ -4694,15 +4851,114 @@
               </a:lnSpc>
             </a:pPr>
             <a:r>
-              <a:rPr lang="en-US" sz="1800" b="0" strike="noStrike" spc="-1">
-                <a:solidFill>
-                  <a:srgbClr val="17161C"/>
-                </a:solidFill>
-                <a:latin typeface="Codec Pro"/>
-              </a:rPr>
-              <a:t>Wie kann man es besser machen</a:t>
-            </a:r>
-            <a:endParaRPr lang="de-DE" sz="1800" b="0" strike="noStrike" spc="-1">
+              <a:rPr lang="en-US" sz="1800" b="0" strike="noStrike" spc="-1" dirty="0">
+                <a:solidFill>
+                  <a:srgbClr val="17161C"/>
+                </a:solidFill>
+                <a:latin typeface="Codec Pro"/>
+              </a:rPr>
+              <a:t>→ </a:t>
+            </a:r>
+            <a:r>
+              <a:rPr lang="de-DE" sz="1800" b="0" strike="noStrike" spc="-1" dirty="0">
+                <a:solidFill>
+                  <a:srgbClr val="17161C"/>
+                </a:solidFill>
+                <a:latin typeface="Codec Pro"/>
+              </a:rPr>
+              <a:t>möglichen</a:t>
+            </a:r>
+            <a:r>
+              <a:rPr lang="en-US" sz="1800" b="0" strike="noStrike" spc="-1" dirty="0">
+                <a:solidFill>
+                  <a:srgbClr val="17161C"/>
+                </a:solidFill>
+                <a:latin typeface="Codec Pro"/>
+              </a:rPr>
+              <a:t> </a:t>
+            </a:r>
+            <a:r>
+              <a:rPr lang="en-US" sz="1800" b="0" strike="noStrike" spc="-1" dirty="0" err="1">
+                <a:solidFill>
+                  <a:srgbClr val="17161C"/>
+                </a:solidFill>
+                <a:latin typeface="Codec Pro"/>
+              </a:rPr>
+              <a:t>infotext</a:t>
+            </a:r>
+            <a:r>
+              <a:rPr lang="en-US" sz="1800" b="0" strike="noStrike" spc="-1" dirty="0">
+                <a:solidFill>
+                  <a:srgbClr val="17161C"/>
+                </a:solidFill>
+                <a:latin typeface="Codec Pro"/>
+              </a:rPr>
+              <a:t> </a:t>
+            </a:r>
+            <a:r>
+              <a:rPr lang="en-US" sz="1800" b="0" strike="noStrike" spc="-1" dirty="0" err="1">
+                <a:solidFill>
+                  <a:srgbClr val="17161C"/>
+                </a:solidFill>
+                <a:latin typeface="Codec Pro"/>
+              </a:rPr>
+              <a:t>einbauen</a:t>
+            </a:r>
+            <a:r>
+              <a:rPr lang="en-US" sz="1800" b="0" strike="noStrike" spc="-1" dirty="0">
+                <a:solidFill>
+                  <a:srgbClr val="17161C"/>
+                </a:solidFill>
+                <a:latin typeface="Codec Pro"/>
+              </a:rPr>
+              <a:t> der </a:t>
+            </a:r>
+            <a:r>
+              <a:rPr lang="en-US" sz="1800" b="0" strike="noStrike" spc="-1" dirty="0" err="1">
+                <a:solidFill>
+                  <a:srgbClr val="17161C"/>
+                </a:solidFill>
+                <a:latin typeface="Codec Pro"/>
+              </a:rPr>
+              <a:t>genauer</a:t>
+            </a:r>
+            <a:r>
+              <a:rPr lang="en-US" sz="1800" b="0" strike="noStrike" spc="-1" dirty="0">
+                <a:solidFill>
+                  <a:srgbClr val="17161C"/>
+                </a:solidFill>
+                <a:latin typeface="Codec Pro"/>
+              </a:rPr>
+              <a:t> </a:t>
+            </a:r>
+            <a:r>
+              <a:rPr lang="en-US" sz="1800" b="0" strike="noStrike" spc="-1" dirty="0" err="1">
+                <a:solidFill>
+                  <a:srgbClr val="17161C"/>
+                </a:solidFill>
+                <a:latin typeface="Codec Pro"/>
+              </a:rPr>
+              <a:t>beschreibt</a:t>
+            </a:r>
+            <a:r>
+              <a:rPr lang="en-US" sz="1800" b="0" strike="noStrike" spc="-1" dirty="0">
+                <a:solidFill>
+                  <a:srgbClr val="17161C"/>
+                </a:solidFill>
+                <a:latin typeface="Codec Pro"/>
+              </a:rPr>
+              <a:t> was „Option“ </a:t>
+            </a:r>
+            <a:r>
+              <a:rPr lang="en-US" sz="1800" b="0" strike="noStrike" spc="-1" dirty="0" err="1">
+                <a:solidFill>
+                  <a:srgbClr val="17161C"/>
+                </a:solidFill>
+                <a:latin typeface="Codec Pro"/>
+              </a:rPr>
+              <a:t>ist</a:t>
+            </a:r>
+            <a:endParaRPr lang="de-DE" sz="1800" b="0" strike="noStrike" spc="-1" dirty="0">
               <a:solidFill>
                 <a:srgbClr val="000000"/>
               </a:solidFill>
@@ -4713,7 +4969,7 @@
       </p:sp>
       <p:sp>
         <p:nvSpPr>
-          <p:cNvPr id="53" name="TextBox 7"/>
+          <p:cNvPr id="66" name="TextBox 5"/>
           <p:cNvSpPr/>
           <p:nvPr/>
         </p:nvSpPr>
@@ -4760,7 +5016,7 @@
                 </a:solidFill>
                 <a:latin typeface="Codec Pro"/>
               </a:rPr>
-              <a:t>Textfehler</a:t>
+              <a:t>Überschrift</a:t>
             </a:r>
             <a:endParaRPr lang="de-DE" sz="8000" b="0" strike="noStrike" spc="-1">
               <a:solidFill>
@@ -4773,7 +5029,7 @@
       </p:sp>
       <p:sp>
         <p:nvSpPr>
-          <p:cNvPr id="54" name="TextBox 8"/>
+          <p:cNvPr id="67" name="TextBox 10"/>
           <p:cNvSpPr/>
           <p:nvPr/>
         </p:nvSpPr>
@@ -4820,7 +5076,7 @@
                 </a:solidFill>
                 <a:latin typeface="Codec Pro"/>
               </a:rPr>
-              <a:t>Beschreibung was falsch gelaufen ist</a:t>
+              <a:t>Unklar was gemeint ist</a:t>
             </a:r>
             <a:endParaRPr lang="de-DE" sz="2400" b="0" strike="noStrike" spc="-1">
               <a:solidFill>
@@ -4831,6 +5087,39 @@
           </a:p>
         </p:txBody>
       </p:sp>
+      <p:pic>
+        <p:nvPicPr>
+          <p:cNvPr id="68" name="Grafik 67"/>
+          <p:cNvPicPr/>
+          <p:nvPr/>
+        </p:nvPicPr>
+        <p:blipFill>
+          <a:blip r:embed="rId4"/>
+          <a:stretch/>
+        </p:blipFill>
+        <p:spPr>
+          <a:xfrm>
+            <a:off x="1028880" y="4709055"/>
+            <a:ext cx="6782040" cy="1819080"/>
+          </a:xfrm>
+          <a:prstGeom prst="rect">
+            <a:avLst/>
+          </a:prstGeom>
+          <a:ln w="0">
+            <a:solidFill>
+              <a:schemeClr val="tx1"/>
+            </a:solidFill>
+          </a:ln>
+          <a:effectLst>
+            <a:outerShdw blurRad="50800" dist="38100" dir="2700000" algn="tl" rotWithShape="0">
+              <a:prstClr val="black">
+                <a:alpha val="40000"/>
+              </a:prstClr>
+            </a:outerShdw>
+            <a:softEdge rad="0"/>
+          </a:effectLst>
+        </p:spPr>
+      </p:pic>
     </p:spTree>
   </p:cSld>
   <p:clrMapOvr>
@@ -4839,7 +5128,7 @@
 </p:sld>
 </file>
 
-<file path=ppt/slides/slide3.xml><?xml version="1.0" encoding="utf-8"?>
+<file path=ppt/slides/slide4.xml><?xml version="1.0" encoding="utf-8"?>
 <p:sld xmlns:a="http://schemas.openxmlformats.org/drawingml/2006/main" xmlns:r="http://schemas.openxmlformats.org/officeDocument/2006/relationships" xmlns:p="http://schemas.openxmlformats.org/presentationml/2006/main">
   <p:cSld>
     <p:bg>
@@ -4866,7 +5155,7 @@
       </p:grpSpPr>
       <p:sp>
         <p:nvSpPr>
-          <p:cNvPr id="55" name="AutoShape 1"/>
+          <p:cNvPr id="69" name="AutoShape 4"/>
           <p:cNvSpPr/>
           <p:nvPr/>
         </p:nvSpPr>
@@ -4914,13 +5203,15 @@
       </p:sp>
       <p:sp>
         <p:nvSpPr>
-          <p:cNvPr id="56" name="Freeform 1"/>
-          <p:cNvSpPr/>
+          <p:cNvPr id="70" name="Freeform 8"/>
+          <p:cNvSpPr>
+            <a:spLocks/>
+          </p:cNvSpPr>
           <p:nvPr/>
         </p:nvSpPr>
         <p:spPr>
           <a:xfrm>
-            <a:off x="11773440" y="-714240"/>
+            <a:off x="11787088" y="-755183"/>
             <a:ext cx="12363120" cy="12250800"/>
           </a:xfrm>
           <a:custGeom>
@@ -4993,7 +5284,7 @@
       </p:sp>
       <p:sp>
         <p:nvSpPr>
-          <p:cNvPr id="57" name="Freeform 5"/>
+          <p:cNvPr id="71" name="Freeform 9"/>
           <p:cNvSpPr/>
           <p:nvPr/>
         </p:nvSpPr>
@@ -5072,7 +5363,7 @@
       </p:sp>
       <p:sp>
         <p:nvSpPr>
-          <p:cNvPr id="58" name="TextBox 1"/>
+          <p:cNvPr id="72" name="TextBox 11"/>
           <p:cNvSpPr/>
           <p:nvPr/>
         </p:nvSpPr>
@@ -5119,7 +5410,7 @@
                 </a:solidFill>
                 <a:latin typeface="Codec Pro"/>
               </a:rPr>
-              <a:t>→ weglassen</a:t>
+              <a:t>→ einheitlich machen</a:t>
             </a:r>
             <a:endParaRPr lang="de-DE" sz="1800" b="0" strike="noStrike" spc="-1">
               <a:solidFill>
@@ -5132,7 +5423,7 @@
       </p:sp>
       <p:sp>
         <p:nvSpPr>
-          <p:cNvPr id="59" name="TextBox 2"/>
+          <p:cNvPr id="73" name="TextBox 12"/>
           <p:cNvSpPr/>
           <p:nvPr/>
         </p:nvSpPr>
@@ -5173,7 +5464,7 @@
               </a:lnSpc>
             </a:pPr>
             <a:r>
-              <a:rPr lang="en-US" sz="8000" b="0" strike="noStrike" spc="-1" dirty="0" err="1">
+              <a:rPr lang="en-US" sz="8000" b="0" strike="noStrike" spc="-1">
                 <a:solidFill>
                   <a:srgbClr val="17161C"/>
                 </a:solidFill>
@@ -5181,16 +5472,7 @@
               </a:rPr>
               <a:t>Struktur</a:t>
             </a:r>
-            <a:r>
-              <a:rPr lang="en-US" sz="8000" b="0" strike="noStrike" spc="-1" dirty="0">
-                <a:solidFill>
-                  <a:srgbClr val="17161C"/>
-                </a:solidFill>
-                <a:latin typeface="Codec Pro"/>
-              </a:rPr>
-              <a:t> </a:t>
-            </a:r>
-            <a:endParaRPr lang="de-DE" sz="8000" b="0" strike="noStrike" spc="-1" dirty="0">
+            <a:endParaRPr lang="de-DE" sz="8000" b="0" strike="noStrike" spc="-1">
               <a:solidFill>
                 <a:srgbClr val="000000"/>
               </a:solidFill>
@@ -5201,14 +5483,14 @@
       </p:sp>
       <p:sp>
         <p:nvSpPr>
-          <p:cNvPr id="60" name="TextBox 3"/>
+          <p:cNvPr id="74" name="TextBox 13"/>
           <p:cNvSpPr/>
           <p:nvPr/>
         </p:nvSpPr>
         <p:spPr>
           <a:xfrm>
-            <a:off x="1028880" y="2435760"/>
-            <a:ext cx="8499600" cy="426960"/>
+            <a:off x="1040400" y="2340000"/>
+            <a:ext cx="8499600" cy="841897"/>
           </a:xfrm>
           <a:prstGeom prst="rect">
             <a:avLst/>
@@ -5242,15 +5524,186 @@
               </a:lnSpc>
             </a:pPr>
             <a:r>
-              <a:rPr lang="en-US" sz="2400" b="0" strike="noStrike" spc="-1">
-                <a:solidFill>
-                  <a:srgbClr val="17161C"/>
-                </a:solidFill>
-                <a:latin typeface="Codec Pro"/>
-              </a:rPr>
-              <a:t>1. erfolgt nur wenn Aufzählung mit 2. erfolgt</a:t>
-            </a:r>
-            <a:endParaRPr lang="de-DE" sz="2400" b="0" strike="noStrike" spc="-1">
+              <a:rPr lang="en-US" sz="2400" b="0" strike="noStrike" spc="-1" dirty="0" err="1">
+                <a:solidFill>
+                  <a:srgbClr val="17161C"/>
+                </a:solidFill>
+                <a:latin typeface="Codec Pro"/>
+              </a:rPr>
+              <a:t>Nicht</a:t>
+            </a:r>
+            <a:r>
+              <a:rPr lang="en-US" sz="2400" b="0" strike="noStrike" spc="-1" dirty="0">
+                <a:solidFill>
+                  <a:srgbClr val="17161C"/>
+                </a:solidFill>
+                <a:latin typeface="Codec Pro"/>
+              </a:rPr>
+              <a:t> </a:t>
+            </a:r>
+            <a:r>
+              <a:rPr lang="en-US" sz="2400" b="0" strike="noStrike" spc="-1" dirty="0" err="1">
+                <a:solidFill>
+                  <a:srgbClr val="17161C"/>
+                </a:solidFill>
+                <a:latin typeface="Codec Pro"/>
+              </a:rPr>
+              <a:t>einheitliche</a:t>
+            </a:r>
+            <a:r>
+              <a:rPr lang="en-US" sz="2400" b="0" strike="noStrike" spc="-1" dirty="0">
+                <a:solidFill>
+                  <a:srgbClr val="17161C"/>
+                </a:solidFill>
+                <a:latin typeface="Codec Pro"/>
+              </a:rPr>
+              <a:t> </a:t>
+            </a:r>
+            <a:r>
+              <a:rPr lang="en-US" sz="2400" b="0" strike="noStrike" spc="-1" dirty="0" err="1">
+                <a:solidFill>
+                  <a:srgbClr val="17161C"/>
+                </a:solidFill>
+                <a:latin typeface="Codec Pro"/>
+              </a:rPr>
+              <a:t>Struktur</a:t>
+            </a:r>
+            <a:r>
+              <a:rPr lang="en-US" sz="2400" b="0" strike="noStrike" spc="-1" dirty="0">
+                <a:solidFill>
+                  <a:srgbClr val="17161C"/>
+                </a:solidFill>
+                <a:latin typeface="Codec Pro"/>
+              </a:rPr>
+              <a:t> für 1.Punkt in </a:t>
+            </a:r>
+            <a:r>
+              <a:rPr lang="en-US" sz="2400" b="0" strike="noStrike" spc="-1" dirty="0" err="1">
+                <a:solidFill>
+                  <a:srgbClr val="17161C"/>
+                </a:solidFill>
+                <a:latin typeface="Codec Pro"/>
+              </a:rPr>
+              <a:t>zusammenhang</a:t>
+            </a:r>
+            <a:r>
+              <a:rPr lang="en-US" sz="2400" b="0" strike="noStrike" spc="-1" dirty="0">
+                <a:solidFill>
+                  <a:srgbClr val="17161C"/>
+                </a:solidFill>
+                <a:latin typeface="Codec Pro"/>
+              </a:rPr>
+              <a:t> </a:t>
+            </a:r>
+            <a:r>
+              <a:rPr lang="en-US" sz="2400" b="0" strike="noStrike" spc="-1" dirty="0" err="1">
+                <a:solidFill>
+                  <a:srgbClr val="17161C"/>
+                </a:solidFill>
+                <a:latin typeface="Codec Pro"/>
+              </a:rPr>
+              <a:t>mit</a:t>
+            </a:r>
+            <a:r>
+              <a:rPr lang="en-US" sz="2400" b="0" strike="noStrike" spc="-1" dirty="0">
+                <a:solidFill>
+                  <a:srgbClr val="17161C"/>
+                </a:solidFill>
+                <a:latin typeface="Codec Pro"/>
+              </a:rPr>
+              <a:t> den </a:t>
+            </a:r>
+            <a:r>
+              <a:rPr lang="en-US" sz="2400" b="0" strike="noStrike" spc="-1" dirty="0" err="1">
+                <a:solidFill>
+                  <a:srgbClr val="17161C"/>
+                </a:solidFill>
+                <a:latin typeface="Codec Pro"/>
+              </a:rPr>
+              <a:t>anderen</a:t>
+            </a:r>
+            <a:r>
+              <a:rPr lang="en-US" sz="2400" b="0" strike="noStrike" spc="-1" dirty="0">
+                <a:solidFill>
+                  <a:srgbClr val="17161C"/>
+                </a:solidFill>
+                <a:latin typeface="Codec Pro"/>
+              </a:rPr>
+              <a:t> </a:t>
+            </a:r>
+            <a:r>
+              <a:rPr lang="en-US" sz="2400" b="0" strike="noStrike" spc="-1" dirty="0" err="1">
+                <a:solidFill>
+                  <a:srgbClr val="17161C"/>
+                </a:solidFill>
+                <a:latin typeface="Codec Pro"/>
+              </a:rPr>
+              <a:t>Punkten</a:t>
+            </a:r>
+            <a:r>
+              <a:rPr lang="en-US" sz="2400" b="0" strike="noStrike" spc="-1" dirty="0">
+                <a:solidFill>
+                  <a:srgbClr val="17161C"/>
+                </a:solidFill>
+                <a:latin typeface="Codec Pro"/>
+              </a:rPr>
+              <a:t>. (</a:t>
+            </a:r>
+            <a:r>
+              <a:rPr lang="en-US" sz="2400" b="0" strike="noStrike" spc="-1" dirty="0" err="1">
+                <a:solidFill>
+                  <a:srgbClr val="17161C"/>
+                </a:solidFill>
+                <a:latin typeface="Codec Pro"/>
+              </a:rPr>
+              <a:t>wird</a:t>
+            </a:r>
+            <a:r>
+              <a:rPr lang="en-US" sz="2400" b="0" strike="noStrike" spc="-1" dirty="0">
+                <a:solidFill>
+                  <a:srgbClr val="17161C"/>
+                </a:solidFill>
+                <a:latin typeface="Codec Pro"/>
+              </a:rPr>
+              <a:t> </a:t>
+            </a:r>
+            <a:r>
+              <a:rPr lang="en-US" sz="2400" b="0" strike="noStrike" spc="-1" dirty="0" err="1">
+                <a:solidFill>
+                  <a:srgbClr val="17161C"/>
+                </a:solidFill>
+                <a:latin typeface="Codec Pro"/>
+              </a:rPr>
+              <a:t>durch</a:t>
+            </a:r>
+            <a:r>
+              <a:rPr lang="en-US" sz="2400" b="0" strike="noStrike" spc="-1" dirty="0">
+                <a:solidFill>
+                  <a:srgbClr val="17161C"/>
+                </a:solidFill>
+                <a:latin typeface="Codec Pro"/>
+              </a:rPr>
+              <a:t> Bild </a:t>
+            </a:r>
+            <a:r>
+              <a:rPr lang="en-US" sz="2400" b="0" strike="noStrike" spc="-1" dirty="0" err="1">
+                <a:solidFill>
+                  <a:srgbClr val="17161C"/>
+                </a:solidFill>
+                <a:latin typeface="Codec Pro"/>
+              </a:rPr>
+              <a:t>unterbrochen</a:t>
+            </a:r>
+            <a:r>
+              <a:rPr lang="en-US" sz="2400" b="0" strike="noStrike" spc="-1" dirty="0">
+                <a:solidFill>
+                  <a:srgbClr val="17161C"/>
+                </a:solidFill>
+                <a:latin typeface="Codec Pro"/>
+              </a:rPr>
+              <a:t>)</a:t>
+            </a:r>
+            <a:endParaRPr lang="de-DE" sz="2400" b="0" strike="noStrike" spc="-1" dirty="0">
               <a:solidFill>
                 <a:srgbClr val="000000"/>
               </a:solidFill>
@@ -5261,7 +5714,7 @@
       </p:sp>
       <p:pic>
         <p:nvPicPr>
-          <p:cNvPr id="61" name="Grafik 60"/>
+          <p:cNvPr id="75" name="Grafik 74"/>
           <p:cNvPicPr/>
           <p:nvPr/>
         </p:nvPicPr>
@@ -5271,8 +5724,8 @@
         </p:blipFill>
         <p:spPr>
           <a:xfrm>
-            <a:off x="540000" y="4680000"/>
-            <a:ext cx="9540000" cy="4709880"/>
+            <a:off x="1440000" y="3848760"/>
+            <a:ext cx="5400000" cy="5871240"/>
           </a:xfrm>
           <a:prstGeom prst="rect">
             <a:avLst/>
@@ -5280,6 +5733,13 @@
           <a:ln w="0">
             <a:noFill/>
           </a:ln>
+          <a:effectLst>
+            <a:outerShdw blurRad="50800" dist="38100" dir="2700000" algn="tl" rotWithShape="0">
+              <a:prstClr val="black">
+                <a:alpha val="40000"/>
+              </a:prstClr>
+            </a:outerShdw>
+          </a:effectLst>
         </p:spPr>
       </p:pic>
     </p:spTree>
@@ -5290,7 +5750,7 @@
 </p:sld>
 </file>
 
-<file path=ppt/slides/slide4.xml><?xml version="1.0" encoding="utf-8"?>
+<file path=ppt/slides/slide5.xml><?xml version="1.0" encoding="utf-8"?>
 <p:sld xmlns:a="http://schemas.openxmlformats.org/drawingml/2006/main" xmlns:r="http://schemas.openxmlformats.org/officeDocument/2006/relationships" xmlns:p="http://schemas.openxmlformats.org/presentationml/2006/main">
   <p:cSld>
     <p:bg>
@@ -5317,7 +5777,7 @@
       </p:grpSpPr>
       <p:sp>
         <p:nvSpPr>
-          <p:cNvPr id="62" name="AutoShape 3"/>
+          <p:cNvPr id="76" name="AutoShape 5"/>
           <p:cNvSpPr/>
           <p:nvPr/>
         </p:nvSpPr>
@@ -5365,7 +5825,7 @@
       </p:sp>
       <p:sp>
         <p:nvSpPr>
-          <p:cNvPr id="63" name="Freeform 6"/>
+          <p:cNvPr id="77" name="Freeform 10"/>
           <p:cNvSpPr/>
           <p:nvPr/>
         </p:nvSpPr>
@@ -5444,7 +5904,7 @@
       </p:sp>
       <p:sp>
         <p:nvSpPr>
-          <p:cNvPr id="64" name="Freeform 7"/>
+          <p:cNvPr id="78" name="Freeform 11"/>
           <p:cNvSpPr/>
           <p:nvPr/>
         </p:nvSpPr>
@@ -5523,14 +5983,14 @@
       </p:sp>
       <p:sp>
         <p:nvSpPr>
-          <p:cNvPr id="65" name="TextBox 4"/>
+          <p:cNvPr id="79" name="TextBox 14"/>
           <p:cNvSpPr/>
           <p:nvPr/>
         </p:nvSpPr>
         <p:spPr>
           <a:xfrm>
             <a:off x="1367640" y="3240000"/>
-            <a:ext cx="5652360" cy="639720"/>
+            <a:ext cx="5652360" cy="299569"/>
           </a:xfrm>
           <a:prstGeom prst="rect">
             <a:avLst/>
@@ -5564,15 +6024,33 @@
               </a:lnSpc>
             </a:pPr>
             <a:r>
-              <a:rPr lang="en-US" sz="1800" b="0" strike="noStrike" spc="-1">
-                <a:solidFill>
-                  <a:srgbClr val="17161C"/>
-                </a:solidFill>
-                <a:latin typeface="Codec Pro"/>
-              </a:rPr>
-              <a:t>→ möglichen infotext einbaun der genauer beschreibt was „Option“ ist</a:t>
-            </a:r>
-            <a:endParaRPr lang="de-DE" sz="1800" b="0" strike="noStrike" spc="-1">
+              <a:rPr lang="en-US" sz="1800" b="0" strike="noStrike" spc="-1" dirty="0">
+                <a:solidFill>
+                  <a:srgbClr val="17161C"/>
+                </a:solidFill>
+                <a:latin typeface="Codec Pro"/>
+              </a:rPr>
+              <a:t>-&gt; </a:t>
+            </a:r>
+            <a:r>
+              <a:rPr lang="en-US" sz="1800" b="0" strike="noStrike" spc="-1" dirty="0" err="1">
+                <a:solidFill>
+                  <a:srgbClr val="17161C"/>
+                </a:solidFill>
+                <a:latin typeface="Codec Pro"/>
+              </a:rPr>
+              <a:t>Stattdesssen</a:t>
+            </a:r>
+            <a:r>
+              <a:rPr lang="en-US" sz="1800" b="0" strike="noStrike" spc="-1" dirty="0">
+                <a:solidFill>
+                  <a:srgbClr val="17161C"/>
+                </a:solidFill>
+                <a:latin typeface="Codec Pro"/>
+              </a:rPr>
+              <a:t> Bullet point list?</a:t>
+            </a:r>
+            <a:endParaRPr lang="de-DE" sz="1800" b="0" strike="noStrike" spc="-1" dirty="0">
               <a:solidFill>
                 <a:srgbClr val="000000"/>
               </a:solidFill>
@@ -5583,7 +6061,7 @@
       </p:sp>
       <p:sp>
         <p:nvSpPr>
-          <p:cNvPr id="66" name="TextBox 5"/>
+          <p:cNvPr id="80" name="TextBox 15"/>
           <p:cNvSpPr/>
           <p:nvPr/>
         </p:nvSpPr>
@@ -5624,15 +6102,15 @@
               </a:lnSpc>
             </a:pPr>
             <a:r>
-              <a:rPr lang="en-US" sz="8000" b="0" strike="noStrike" spc="-1">
-                <a:solidFill>
-                  <a:srgbClr val="17161C"/>
-                </a:solidFill>
-                <a:latin typeface="Codec Pro"/>
-              </a:rPr>
-              <a:t>Überschrift</a:t>
-            </a:r>
-            <a:endParaRPr lang="de-DE" sz="8000" b="0" strike="noStrike" spc="-1">
+              <a:rPr lang="en-US" sz="8000" b="0" strike="noStrike" spc="-1" dirty="0">
+                <a:solidFill>
+                  <a:srgbClr val="17161C"/>
+                </a:solidFill>
+                <a:latin typeface="Codec Pro"/>
+              </a:rPr>
+              <a:t>Text</a:t>
+            </a:r>
+            <a:endParaRPr lang="de-DE" sz="8000" b="0" strike="noStrike" spc="-1" dirty="0">
               <a:solidFill>
                 <a:srgbClr val="000000"/>
               </a:solidFill>
@@ -5643,14 +6121,14 @@
       </p:sp>
       <p:sp>
         <p:nvSpPr>
-          <p:cNvPr id="67" name="TextBox 10"/>
+          <p:cNvPr id="81" name="TextBox 16"/>
           <p:cNvSpPr/>
           <p:nvPr/>
         </p:nvSpPr>
         <p:spPr>
           <a:xfrm>
             <a:off x="1028880" y="2435760"/>
-            <a:ext cx="8499600" cy="426960"/>
+            <a:ext cx="8499600" cy="405880"/>
           </a:xfrm>
           <a:prstGeom prst="rect">
             <a:avLst/>
@@ -5684,15 +6162,114 @@
               </a:lnSpc>
             </a:pPr>
             <a:r>
-              <a:rPr lang="en-US" sz="2400" b="0" strike="noStrike" spc="-1">
-                <a:solidFill>
-                  <a:srgbClr val="17161C"/>
-                </a:solidFill>
-                <a:latin typeface="Codec Pro"/>
-              </a:rPr>
-              <a:t>Unklar was gemeint ist</a:t>
-            </a:r>
-            <a:endParaRPr lang="de-DE" sz="2400" b="0" strike="noStrike" spc="-1">
+              <a:rPr lang="en-US" sz="2400" b="0" strike="noStrike" spc="-1" dirty="0">
+                <a:solidFill>
+                  <a:srgbClr val="17161C"/>
+                </a:solidFill>
+                <a:latin typeface="Codec Pro"/>
+              </a:rPr>
+              <a:t>1. </a:t>
+            </a:r>
+            <a:r>
+              <a:rPr lang="en-US" sz="2400" b="0" strike="noStrike" spc="-1" dirty="0" err="1">
+                <a:solidFill>
+                  <a:srgbClr val="17161C"/>
+                </a:solidFill>
+                <a:latin typeface="Codec Pro"/>
+              </a:rPr>
+              <a:t>erfolgt</a:t>
+            </a:r>
+            <a:r>
+              <a:rPr lang="en-US" sz="2400" b="0" strike="noStrike" spc="-1" dirty="0">
+                <a:solidFill>
+                  <a:srgbClr val="17161C"/>
+                </a:solidFill>
+                <a:latin typeface="Codec Pro"/>
+              </a:rPr>
+              <a:t> </a:t>
+            </a:r>
+            <a:r>
+              <a:rPr lang="en-US" sz="2400" b="0" strike="noStrike" spc="-1" dirty="0" err="1">
+                <a:solidFill>
+                  <a:srgbClr val="17161C"/>
+                </a:solidFill>
+                <a:latin typeface="Codec Pro"/>
+              </a:rPr>
+              <a:t>nur</a:t>
+            </a:r>
+            <a:r>
+              <a:rPr lang="en-US" sz="2400" b="0" strike="noStrike" spc="-1" dirty="0">
+                <a:solidFill>
+                  <a:srgbClr val="17161C"/>
+                </a:solidFill>
+                <a:latin typeface="Codec Pro"/>
+              </a:rPr>
+              <a:t> </a:t>
+            </a:r>
+            <a:r>
+              <a:rPr lang="en-US" sz="2400" b="0" strike="noStrike" spc="-1" dirty="0" err="1">
+                <a:solidFill>
+                  <a:srgbClr val="17161C"/>
+                </a:solidFill>
+                <a:latin typeface="Codec Pro"/>
+              </a:rPr>
+              <a:t>wenn</a:t>
+            </a:r>
+            <a:r>
+              <a:rPr lang="en-US" sz="2400" b="0" strike="noStrike" spc="-1" dirty="0">
+                <a:solidFill>
+                  <a:srgbClr val="17161C"/>
+                </a:solidFill>
+                <a:latin typeface="Codec Pro"/>
+              </a:rPr>
+              <a:t> </a:t>
+            </a:r>
+            <a:r>
+              <a:rPr lang="en-US" sz="2400" b="0" strike="noStrike" spc="-1" dirty="0" err="1">
+                <a:solidFill>
+                  <a:srgbClr val="17161C"/>
+                </a:solidFill>
+                <a:latin typeface="Codec Pro"/>
+              </a:rPr>
+              <a:t>Aufzählung</a:t>
+            </a:r>
+            <a:r>
+              <a:rPr lang="en-US" sz="2400" b="0" strike="noStrike" spc="-1" dirty="0">
+                <a:solidFill>
+                  <a:srgbClr val="17161C"/>
+                </a:solidFill>
+                <a:latin typeface="Codec Pro"/>
+              </a:rPr>
+              <a:t> </a:t>
+            </a:r>
+            <a:r>
+              <a:rPr lang="en-US" sz="2400" b="0" strike="noStrike" spc="-1" dirty="0" err="1">
+                <a:solidFill>
+                  <a:srgbClr val="17161C"/>
+                </a:solidFill>
+                <a:latin typeface="Codec Pro"/>
+              </a:rPr>
+              <a:t>mit</a:t>
+            </a:r>
+            <a:r>
+              <a:rPr lang="en-US" sz="2400" b="0" strike="noStrike" spc="-1" dirty="0">
+                <a:solidFill>
+                  <a:srgbClr val="17161C"/>
+                </a:solidFill>
+                <a:latin typeface="Codec Pro"/>
+              </a:rPr>
+              <a:t> 2. </a:t>
+            </a:r>
+            <a:r>
+              <a:rPr lang="en-US" sz="2400" b="0" strike="noStrike" spc="-1" dirty="0" err="1">
+                <a:solidFill>
+                  <a:srgbClr val="17161C"/>
+                </a:solidFill>
+                <a:latin typeface="Codec Pro"/>
+              </a:rPr>
+              <a:t>erfolgt</a:t>
+            </a:r>
+            <a:endParaRPr lang="de-DE" sz="2400" b="0" strike="noStrike" spc="-1" dirty="0">
               <a:solidFill>
                 <a:srgbClr val="000000"/>
               </a:solidFill>
@@ -5703,18 +6280,19 @@
       </p:sp>
       <p:pic>
         <p:nvPicPr>
-          <p:cNvPr id="68" name="Grafik 67"/>
+          <p:cNvPr id="82" name="Grafik 81"/>
           <p:cNvPicPr/>
           <p:nvPr/>
         </p:nvPicPr>
         <p:blipFill>
           <a:blip r:embed="rId4"/>
+          <a:srcRect b="76372"/>
           <a:stretch/>
         </p:blipFill>
         <p:spPr>
           <a:xfrm>
-            <a:off x="417960" y="4320000"/>
-            <a:ext cx="6782040" cy="1819080"/>
+            <a:off x="398160" y="3918436"/>
+            <a:ext cx="6648840" cy="1079640"/>
           </a:xfrm>
           <a:prstGeom prst="rect">
             <a:avLst/>
@@ -5722,6 +6300,73 @@
           <a:ln w="0">
             <a:noFill/>
           </a:ln>
+          <a:effectLst>
+            <a:outerShdw blurRad="50800" dist="38100" dir="2700000" algn="tl" rotWithShape="0">
+              <a:prstClr val="black">
+                <a:alpha val="40000"/>
+              </a:prstClr>
+            </a:outerShdw>
+          </a:effectLst>
+        </p:spPr>
+      </p:pic>
+      <p:pic>
+        <p:nvPicPr>
+          <p:cNvPr id="83" name="Grafik 82"/>
+          <p:cNvPicPr/>
+          <p:nvPr/>
+        </p:nvPicPr>
+        <p:blipFill>
+          <a:blip r:embed="rId5"/>
+          <a:stretch/>
+        </p:blipFill>
+        <p:spPr>
+          <a:xfrm>
+            <a:off x="360000" y="6039360"/>
+            <a:ext cx="6687000" cy="980640"/>
+          </a:xfrm>
+          <a:prstGeom prst="rect">
+            <a:avLst/>
+          </a:prstGeom>
+          <a:ln w="0">
+            <a:noFill/>
+          </a:ln>
+          <a:effectLst>
+            <a:outerShdw blurRad="50800" dist="38100" dir="2700000" algn="tl" rotWithShape="0">
+              <a:prstClr val="black">
+                <a:alpha val="40000"/>
+              </a:prstClr>
+            </a:outerShdw>
+          </a:effectLst>
+        </p:spPr>
+      </p:pic>
+      <p:pic>
+        <p:nvPicPr>
+          <p:cNvPr id="84" name="Grafik 83"/>
+          <p:cNvPicPr/>
+          <p:nvPr/>
+        </p:nvPicPr>
+        <p:blipFill>
+          <a:blip r:embed="rId6"/>
+          <a:stretch/>
+        </p:blipFill>
+        <p:spPr>
+          <a:xfrm>
+            <a:off x="720000" y="7560000"/>
+            <a:ext cx="6639480" cy="818640"/>
+          </a:xfrm>
+          <a:prstGeom prst="rect">
+            <a:avLst/>
+          </a:prstGeom>
+          <a:ln w="0">
+            <a:noFill/>
+          </a:ln>
+          <a:effectLst>
+            <a:outerShdw blurRad="50800" dist="38100" dir="2700000" algn="tl" rotWithShape="0">
+              <a:prstClr val="black">
+                <a:alpha val="40000"/>
+              </a:prstClr>
+            </a:outerShdw>
+          </a:effectLst>
         </p:spPr>
       </p:pic>
     </p:spTree>
@@ -5732,7 +6377,7 @@
 </p:sld>
 </file>
 
-<file path=ppt/slides/slide5.xml><?xml version="1.0" encoding="utf-8"?>
+<file path=ppt/slides/slide6.xml><?xml version="1.0" encoding="utf-8"?>
 <p:sld xmlns:a="http://schemas.openxmlformats.org/drawingml/2006/main" xmlns:r="http://schemas.openxmlformats.org/officeDocument/2006/relationships" xmlns:p="http://schemas.openxmlformats.org/presentationml/2006/main">
   <p:cSld>
     <p:bg>
@@ -5759,7 +6404,7 @@
       </p:grpSpPr>
       <p:sp>
         <p:nvSpPr>
-          <p:cNvPr id="69" name="AutoShape 4"/>
+          <p:cNvPr id="85" name="AutoShape 6"/>
           <p:cNvSpPr/>
           <p:nvPr/>
         </p:nvSpPr>
@@ -5807,7 +6452,7 @@
       </p:sp>
       <p:sp>
         <p:nvSpPr>
-          <p:cNvPr id="70" name="Freeform 8"/>
+          <p:cNvPr id="86" name="Freeform 12"/>
           <p:cNvSpPr/>
           <p:nvPr/>
         </p:nvSpPr>
@@ -5886,7 +6531,7 @@
       </p:sp>
       <p:sp>
         <p:nvSpPr>
-          <p:cNvPr id="71" name="Freeform 9"/>
+          <p:cNvPr id="87" name="Freeform 13"/>
           <p:cNvSpPr/>
           <p:nvPr/>
         </p:nvSpPr>
@@ -5965,14 +6610,14 @@
       </p:sp>
       <p:sp>
         <p:nvSpPr>
-          <p:cNvPr id="72" name="TextBox 11"/>
+          <p:cNvPr id="88" name="TextBox 17"/>
           <p:cNvSpPr/>
           <p:nvPr/>
         </p:nvSpPr>
         <p:spPr>
           <a:xfrm>
             <a:off x="1367640" y="3240000"/>
-            <a:ext cx="5652360" cy="320400"/>
+            <a:ext cx="5652360" cy="299569"/>
           </a:xfrm>
           <a:prstGeom prst="rect">
             <a:avLst/>
@@ -6006,15 +6651,60 @@
               </a:lnSpc>
             </a:pPr>
             <a:r>
-              <a:rPr lang="en-US" sz="1800" b="0" strike="noStrike" spc="-1">
-                <a:solidFill>
-                  <a:srgbClr val="17161C"/>
-                </a:solidFill>
-                <a:latin typeface="Codec Pro"/>
-              </a:rPr>
-              <a:t>→ einheitlich machen</a:t>
-            </a:r>
-            <a:endParaRPr lang="de-DE" sz="1800" b="0" strike="noStrike" spc="-1">
+              <a:rPr lang="en-US" sz="1800" b="0" strike="noStrike" spc="-1" dirty="0">
+                <a:solidFill>
+                  <a:srgbClr val="17161C"/>
+                </a:solidFill>
+                <a:latin typeface="Codec Pro"/>
+              </a:rPr>
+              <a:t>-&gt; </a:t>
+            </a:r>
+            <a:r>
+              <a:rPr lang="en-US" sz="1800" b="0" strike="noStrike" spc="-1" dirty="0" err="1">
+                <a:solidFill>
+                  <a:srgbClr val="17161C"/>
+                </a:solidFill>
+                <a:latin typeface="Codec Pro"/>
+              </a:rPr>
+              <a:t>Weiteres</a:t>
+            </a:r>
+            <a:r>
+              <a:rPr lang="en-US" sz="1800" b="0" strike="noStrike" spc="-1" dirty="0">
+                <a:solidFill>
+                  <a:srgbClr val="17161C"/>
+                </a:solidFill>
+                <a:latin typeface="Codec Pro"/>
+              </a:rPr>
+              <a:t> Bild für </a:t>
+            </a:r>
+            <a:r>
+              <a:rPr lang="en-US" sz="1800" b="0" strike="noStrike" spc="-1" dirty="0" err="1">
+                <a:solidFill>
+                  <a:srgbClr val="17161C"/>
+                </a:solidFill>
+                <a:latin typeface="Codec Pro"/>
+              </a:rPr>
+              <a:t>besseres</a:t>
+            </a:r>
+            <a:r>
+              <a:rPr lang="en-US" sz="1800" b="0" strike="noStrike" spc="-1" dirty="0">
+                <a:solidFill>
+                  <a:srgbClr val="17161C"/>
+                </a:solidFill>
+                <a:latin typeface="Codec Pro"/>
+              </a:rPr>
+              <a:t> </a:t>
+            </a:r>
+            <a:r>
+              <a:rPr lang="en-US" sz="1800" b="0" strike="noStrike" spc="-1" dirty="0" err="1">
+                <a:solidFill>
+                  <a:srgbClr val="17161C"/>
+                </a:solidFill>
+                <a:latin typeface="Codec Pro"/>
+              </a:rPr>
+              <a:t>Verständnis</a:t>
+            </a:r>
+            <a:endParaRPr lang="de-DE" sz="1800" b="0" strike="noStrike" spc="-1" dirty="0">
               <a:solidFill>
                 <a:srgbClr val="000000"/>
               </a:solidFill>
@@ -6025,7 +6715,7 @@
       </p:sp>
       <p:sp>
         <p:nvSpPr>
-          <p:cNvPr id="73" name="TextBox 12"/>
+          <p:cNvPr id="89" name="TextBox 18"/>
           <p:cNvSpPr/>
           <p:nvPr/>
         </p:nvSpPr>
@@ -6066,15 +6756,15 @@
               </a:lnSpc>
             </a:pPr>
             <a:r>
-              <a:rPr lang="en-US" sz="8000" b="0" strike="noStrike" spc="-1">
-                <a:solidFill>
-                  <a:srgbClr val="17161C"/>
-                </a:solidFill>
-                <a:latin typeface="Codec Pro"/>
-              </a:rPr>
-              <a:t>Struktur</a:t>
-            </a:r>
-            <a:endParaRPr lang="de-DE" sz="8000" b="0" strike="noStrike" spc="-1">
+              <a:rPr lang="en-US" sz="8000" b="0" strike="noStrike" spc="-1" dirty="0" err="1">
+                <a:solidFill>
+                  <a:srgbClr val="17161C"/>
+                </a:solidFill>
+                <a:latin typeface="Codec Pro"/>
+              </a:rPr>
+              <a:t>Bildkontext</a:t>
+            </a:r>
+            <a:endParaRPr lang="de-DE" sz="8000" b="0" strike="noStrike" spc="-1" dirty="0">
               <a:solidFill>
                 <a:srgbClr val="000000"/>
               </a:solidFill>
@@ -6085,14 +6775,14 @@
       </p:sp>
       <p:sp>
         <p:nvSpPr>
-          <p:cNvPr id="74" name="TextBox 13"/>
+          <p:cNvPr id="90" name="TextBox 19"/>
           <p:cNvSpPr/>
           <p:nvPr/>
         </p:nvSpPr>
         <p:spPr>
           <a:xfrm>
-            <a:off x="1040400" y="2340000"/>
-            <a:ext cx="8499600" cy="852840"/>
+            <a:off x="1028880" y="2435760"/>
+            <a:ext cx="8499600" cy="405880"/>
           </a:xfrm>
           <a:prstGeom prst="rect">
             <a:avLst/>
@@ -6126,15 +6816,87 @@
               </a:lnSpc>
             </a:pPr>
             <a:r>
-              <a:rPr lang="en-US" sz="2400" b="0" strike="noStrike" spc="-1">
-                <a:solidFill>
-                  <a:srgbClr val="17161C"/>
-                </a:solidFill>
-                <a:latin typeface="Codec Pro"/>
-              </a:rPr>
-              <a:t>Nicht einheitliche Struktur für 1.Punkt in zusammenhang mit einem bild</a:t>
-            </a:r>
-            <a:endParaRPr lang="de-DE" sz="2400" b="0" strike="noStrike" spc="-1">
+              <a:rPr lang="en-US" sz="2400" spc="-1" dirty="0" err="1">
+                <a:solidFill>
+                  <a:srgbClr val="17161C"/>
+                </a:solidFill>
+                <a:latin typeface="Codec Pro"/>
+              </a:rPr>
+              <a:t>Gerätefach</a:t>
+            </a:r>
+            <a:r>
+              <a:rPr lang="en-US" sz="2400" spc="-1" dirty="0">
+                <a:solidFill>
+                  <a:srgbClr val="17161C"/>
+                </a:solidFill>
+                <a:latin typeface="Codec Pro"/>
+              </a:rPr>
+              <a:t> </a:t>
+            </a:r>
+            <a:r>
+              <a:rPr lang="en-US" sz="2400" spc="-1" dirty="0" err="1">
+                <a:solidFill>
+                  <a:srgbClr val="17161C"/>
+                </a:solidFill>
+                <a:latin typeface="Codec Pro"/>
+              </a:rPr>
+              <a:t>wird</a:t>
+            </a:r>
+            <a:r>
+              <a:rPr lang="en-US" sz="2400" spc="-1" dirty="0">
+                <a:solidFill>
+                  <a:srgbClr val="17161C"/>
+                </a:solidFill>
+                <a:latin typeface="Codec Pro"/>
+              </a:rPr>
+              <a:t> auf </a:t>
+            </a:r>
+            <a:r>
+              <a:rPr lang="en-US" sz="2400" spc="-1" dirty="0" err="1">
+                <a:solidFill>
+                  <a:srgbClr val="17161C"/>
+                </a:solidFill>
+                <a:latin typeface="Codec Pro"/>
+              </a:rPr>
+              <a:t>folge</a:t>
+            </a:r>
+            <a:r>
+              <a:rPr lang="en-US" sz="2400" spc="-1" dirty="0">
+                <a:solidFill>
+                  <a:srgbClr val="17161C"/>
+                </a:solidFill>
+                <a:latin typeface="Codec Pro"/>
+              </a:rPr>
+              <a:t> Bild </a:t>
+            </a:r>
+            <a:r>
+              <a:rPr lang="en-US" sz="2400" spc="-1" dirty="0" err="1">
+                <a:solidFill>
+                  <a:srgbClr val="17161C"/>
+                </a:solidFill>
+                <a:latin typeface="Codec Pro"/>
+              </a:rPr>
+              <a:t>nicht</a:t>
+            </a:r>
+            <a:r>
+              <a:rPr lang="en-US" sz="2400" spc="-1" dirty="0">
+                <a:solidFill>
+                  <a:srgbClr val="17161C"/>
+                </a:solidFill>
+                <a:latin typeface="Codec Pro"/>
+              </a:rPr>
+              <a:t> </a:t>
+            </a:r>
+            <a:r>
+              <a:rPr lang="en-US" sz="2400" spc="-1" dirty="0" err="1">
+                <a:solidFill>
+                  <a:srgbClr val="17161C"/>
+                </a:solidFill>
+                <a:latin typeface="Codec Pro"/>
+              </a:rPr>
+              <a:t>gezeigt</a:t>
+            </a:r>
+            <a:endParaRPr lang="de-DE" sz="2400" b="0" strike="noStrike" spc="-1" dirty="0">
               <a:solidFill>
                 <a:srgbClr val="000000"/>
               </a:solidFill>
@@ -6145,7 +6907,7 @@
       </p:sp>
       <p:pic>
         <p:nvPicPr>
-          <p:cNvPr id="75" name="Grafik 74"/>
+          <p:cNvPr id="91" name="Grafik 90"/>
           <p:cNvPicPr/>
           <p:nvPr/>
         </p:nvPicPr>
@@ -6155,8 +6917,8 @@
         </p:blipFill>
         <p:spPr>
           <a:xfrm>
-            <a:off x="1440000" y="3848760"/>
-            <a:ext cx="5400000" cy="5871240"/>
+            <a:off x="1140534" y="3937929"/>
+            <a:ext cx="5035320" cy="5760000"/>
           </a:xfrm>
           <a:prstGeom prst="rect">
             <a:avLst/>
@@ -6164,6 +6926,13 @@
           <a:ln w="0">
             <a:noFill/>
           </a:ln>
+          <a:effectLst>
+            <a:outerShdw blurRad="50800" dist="38100" dir="2700000" algn="tl" rotWithShape="0">
+              <a:prstClr val="black">
+                <a:alpha val="40000"/>
+              </a:prstClr>
+            </a:outerShdw>
+          </a:effectLst>
         </p:spPr>
       </p:pic>
     </p:spTree>
@@ -6174,7 +6943,7 @@
 </p:sld>
 </file>
 
-<file path=ppt/slides/slide6.xml><?xml version="1.0" encoding="utf-8"?>
+<file path=ppt/slides/slide7.xml><?xml version="1.0" encoding="utf-8"?>
 <p:sld xmlns:a="http://schemas.openxmlformats.org/drawingml/2006/main" xmlns:r="http://schemas.openxmlformats.org/officeDocument/2006/relationships" xmlns:p="http://schemas.openxmlformats.org/presentationml/2006/main">
   <p:cSld>
     <p:bg>
@@ -6201,7 +6970,7 @@
       </p:grpSpPr>
       <p:sp>
         <p:nvSpPr>
-          <p:cNvPr id="76" name="AutoShape 5"/>
+          <p:cNvPr id="92" name="AutoShape 7"/>
           <p:cNvSpPr/>
           <p:nvPr/>
         </p:nvSpPr>
@@ -6249,7 +7018,7 @@
       </p:sp>
       <p:sp>
         <p:nvSpPr>
-          <p:cNvPr id="77" name="Freeform 10"/>
+          <p:cNvPr id="93" name="Freeform 14"/>
           <p:cNvSpPr/>
           <p:nvPr/>
         </p:nvSpPr>
@@ -6328,7 +7097,7 @@
       </p:sp>
       <p:sp>
         <p:nvSpPr>
-          <p:cNvPr id="78" name="Freeform 11"/>
+          <p:cNvPr id="94" name="Freeform 15"/>
           <p:cNvSpPr/>
           <p:nvPr/>
         </p:nvSpPr>
@@ -6407,14 +7176,14 @@
       </p:sp>
       <p:sp>
         <p:nvSpPr>
-          <p:cNvPr id="79" name="TextBox 14"/>
+          <p:cNvPr id="95" name="TextBox 20"/>
           <p:cNvSpPr/>
           <p:nvPr/>
         </p:nvSpPr>
         <p:spPr>
           <a:xfrm>
             <a:off x="1367640" y="3240000"/>
-            <a:ext cx="5652360" cy="320400"/>
+            <a:ext cx="5652360" cy="620170"/>
           </a:xfrm>
           <a:prstGeom prst="rect">
             <a:avLst/>
@@ -6448,15 +7217,186 @@
               </a:lnSpc>
             </a:pPr>
             <a:r>
-              <a:rPr lang="en-US" sz="1800" b="0" strike="noStrike" spc="-1">
-                <a:solidFill>
-                  <a:srgbClr val="17161C"/>
-                </a:solidFill>
-                <a:latin typeface="Codec Pro"/>
-              </a:rPr>
-              <a:t>Wie kann man es besser machen</a:t>
-            </a:r>
-            <a:endParaRPr lang="de-DE" sz="1800" b="0" strike="noStrike" spc="-1">
+              <a:rPr lang="en-US" sz="1800" b="0" strike="noStrike" spc="-1" dirty="0" err="1">
+                <a:solidFill>
+                  <a:srgbClr val="17161C"/>
+                </a:solidFill>
+                <a:latin typeface="Codec Pro"/>
+              </a:rPr>
+              <a:t>Folgender</a:t>
+            </a:r>
+            <a:r>
+              <a:rPr lang="en-US" sz="1800" b="0" strike="noStrike" spc="-1" dirty="0">
+                <a:solidFill>
+                  <a:srgbClr val="17161C"/>
+                </a:solidFill>
+                <a:latin typeface="Codec Pro"/>
+              </a:rPr>
+              <a:t> Text </a:t>
+            </a:r>
+            <a:r>
+              <a:rPr lang="en-US" sz="1800" b="0" strike="noStrike" spc="-1" dirty="0" err="1">
+                <a:solidFill>
+                  <a:srgbClr val="17161C"/>
+                </a:solidFill>
+                <a:latin typeface="Codec Pro"/>
+              </a:rPr>
+              <a:t>wird</a:t>
+            </a:r>
+            <a:r>
+              <a:rPr lang="en-US" sz="1800" b="0" strike="noStrike" spc="-1" dirty="0">
+                <a:solidFill>
+                  <a:srgbClr val="17161C"/>
+                </a:solidFill>
+                <a:latin typeface="Codec Pro"/>
+              </a:rPr>
+              <a:t> </a:t>
+            </a:r>
+            <a:r>
+              <a:rPr lang="en-US" sz="1800" b="0" strike="noStrike" spc="-1" dirty="0" err="1">
+                <a:solidFill>
+                  <a:srgbClr val="17161C"/>
+                </a:solidFill>
+                <a:latin typeface="Codec Pro"/>
+              </a:rPr>
+              <a:t>schon</a:t>
+            </a:r>
+            <a:r>
+              <a:rPr lang="en-US" sz="1800" b="0" strike="noStrike" spc="-1" dirty="0">
+                <a:solidFill>
+                  <a:srgbClr val="17161C"/>
+                </a:solidFill>
+                <a:latin typeface="Codec Pro"/>
+              </a:rPr>
+              <a:t> </a:t>
+            </a:r>
+            <a:r>
+              <a:rPr lang="en-US" sz="1800" b="0" strike="noStrike" spc="-1" dirty="0" err="1">
+                <a:solidFill>
+                  <a:srgbClr val="17161C"/>
+                </a:solidFill>
+                <a:latin typeface="Codec Pro"/>
+              </a:rPr>
+              <a:t>durch</a:t>
+            </a:r>
+            <a:r>
+              <a:rPr lang="en-US" sz="1800" b="0" strike="noStrike" spc="-1" dirty="0">
+                <a:solidFill>
+                  <a:srgbClr val="17161C"/>
+                </a:solidFill>
+                <a:latin typeface="Codec Pro"/>
+              </a:rPr>
+              <a:t> </a:t>
+            </a:r>
+            <a:r>
+              <a:rPr lang="en-US" sz="1800" b="0" strike="noStrike" spc="-1" dirty="0" err="1">
+                <a:solidFill>
+                  <a:srgbClr val="17161C"/>
+                </a:solidFill>
+                <a:latin typeface="Codec Pro"/>
+              </a:rPr>
+              <a:t>viele</a:t>
+            </a:r>
+            <a:r>
+              <a:rPr lang="en-US" sz="1800" b="0" strike="noStrike" spc="-1" dirty="0">
+                <a:solidFill>
+                  <a:srgbClr val="17161C"/>
+                </a:solidFill>
+                <a:latin typeface="Codec Pro"/>
+              </a:rPr>
+              <a:t> </a:t>
+            </a:r>
+            <a:r>
+              <a:rPr lang="en-US" sz="1800" b="0" strike="noStrike" spc="-1" dirty="0" err="1">
+                <a:solidFill>
+                  <a:srgbClr val="17161C"/>
+                </a:solidFill>
+                <a:latin typeface="Codec Pro"/>
+              </a:rPr>
+              <a:t>Bildbeispiele</a:t>
+            </a:r>
+            <a:r>
+              <a:rPr lang="en-US" sz="1800" b="0" strike="noStrike" spc="-1" dirty="0">
+                <a:solidFill>
+                  <a:srgbClr val="17161C"/>
+                </a:solidFill>
+                <a:latin typeface="Codec Pro"/>
+              </a:rPr>
+              <a:t> </a:t>
+            </a:r>
+            <a:r>
+              <a:rPr lang="en-US" sz="1800" b="0" strike="noStrike" spc="-1" dirty="0" err="1">
+                <a:solidFill>
+                  <a:srgbClr val="17161C"/>
+                </a:solidFill>
+                <a:latin typeface="Codec Pro"/>
+              </a:rPr>
+              <a:t>unterbrochen</a:t>
+            </a:r>
+            <a:r>
+              <a:rPr lang="en-US" spc="-1" dirty="0">
+                <a:solidFill>
+                  <a:srgbClr val="17161C"/>
+                </a:solidFill>
+                <a:latin typeface="Codec Pro"/>
+              </a:rPr>
+              <a:t> -&gt; </a:t>
+            </a:r>
+            <a:r>
+              <a:rPr lang="en-US" spc="-1" dirty="0" err="1">
+                <a:solidFill>
+                  <a:srgbClr val="17161C"/>
+                </a:solidFill>
+                <a:latin typeface="Codec Pro"/>
+              </a:rPr>
+              <a:t>Überschrift</a:t>
+            </a:r>
+            <a:r>
+              <a:rPr lang="en-US" spc="-1" dirty="0">
+                <a:solidFill>
+                  <a:srgbClr val="17161C"/>
+                </a:solidFill>
+                <a:latin typeface="Codec Pro"/>
+              </a:rPr>
+              <a:t> auf </a:t>
+            </a:r>
+            <a:r>
+              <a:rPr lang="en-US" spc="-1" dirty="0" err="1">
+                <a:solidFill>
+                  <a:srgbClr val="17161C"/>
+                </a:solidFill>
+                <a:latin typeface="Codec Pro"/>
+              </a:rPr>
+              <a:t>nächste</a:t>
+            </a:r>
+            <a:r>
+              <a:rPr lang="en-US" spc="-1" dirty="0">
+                <a:solidFill>
+                  <a:srgbClr val="17161C"/>
+                </a:solidFill>
+                <a:latin typeface="Codec Pro"/>
+              </a:rPr>
+              <a:t> </a:t>
+            </a:r>
+            <a:r>
+              <a:rPr lang="en-US" spc="-1" dirty="0" err="1">
+                <a:solidFill>
+                  <a:srgbClr val="17161C"/>
+                </a:solidFill>
+                <a:latin typeface="Codec Pro"/>
+              </a:rPr>
+              <a:t>Seite</a:t>
+            </a:r>
+            <a:r>
+              <a:rPr lang="en-US" spc="-1" dirty="0">
+                <a:solidFill>
+                  <a:srgbClr val="17161C"/>
+                </a:solidFill>
+                <a:latin typeface="Codec Pro"/>
+              </a:rPr>
+              <a:t> </a:t>
+            </a:r>
+            <a:endParaRPr lang="de-DE" sz="1800" b="0" strike="noStrike" spc="-1" dirty="0">
               <a:solidFill>
                 <a:srgbClr val="000000"/>
               </a:solidFill>
@@ -6467,7 +7407,7 @@
       </p:sp>
       <p:sp>
         <p:nvSpPr>
-          <p:cNvPr id="80" name="TextBox 15"/>
+          <p:cNvPr id="96" name="TextBox 21"/>
           <p:cNvSpPr/>
           <p:nvPr/>
         </p:nvSpPr>
@@ -6508,15 +7448,15 @@
               </a:lnSpc>
             </a:pPr>
             <a:r>
-              <a:rPr lang="en-US" sz="8000" b="0" strike="noStrike" spc="-1">
-                <a:solidFill>
-                  <a:srgbClr val="17161C"/>
-                </a:solidFill>
-                <a:latin typeface="Codec Pro"/>
-              </a:rPr>
-              <a:t>Textfehler</a:t>
-            </a:r>
-            <a:endParaRPr lang="de-DE" sz="8000" b="0" strike="noStrike" spc="-1">
+              <a:rPr lang="en-US" sz="8000" b="0" strike="noStrike" spc="-1" dirty="0" err="1">
+                <a:solidFill>
+                  <a:srgbClr val="17161C"/>
+                </a:solidFill>
+                <a:latin typeface="Codec Pro"/>
+              </a:rPr>
+              <a:t>Struktur</a:t>
+            </a:r>
+            <a:endParaRPr lang="de-DE" sz="8000" b="0" strike="noStrike" spc="-1" dirty="0">
               <a:solidFill>
                 <a:srgbClr val="000000"/>
               </a:solidFill>
@@ -6527,14 +7467,14 @@
       </p:sp>
       <p:sp>
         <p:nvSpPr>
-          <p:cNvPr id="81" name="TextBox 16"/>
+          <p:cNvPr id="97" name="TextBox 22"/>
           <p:cNvSpPr/>
           <p:nvPr/>
         </p:nvSpPr>
         <p:spPr>
           <a:xfrm>
             <a:off x="1028880" y="2435760"/>
-            <a:ext cx="8499600" cy="426960"/>
+            <a:ext cx="8499600" cy="405880"/>
           </a:xfrm>
           <a:prstGeom prst="rect">
             <a:avLst/>
@@ -6568,15 +7508,96 @@
               </a:lnSpc>
             </a:pPr>
             <a:r>
-              <a:rPr lang="en-US" sz="2400" b="0" strike="noStrike" spc="-1">
-                <a:solidFill>
-                  <a:srgbClr val="17161C"/>
-                </a:solidFill>
-                <a:latin typeface="Codec Pro"/>
-              </a:rPr>
-              <a:t>Beschreibung was falsch gelaufen ist</a:t>
-            </a:r>
-            <a:endParaRPr lang="de-DE" sz="2400" b="0" strike="noStrike" spc="-1">
+              <a:rPr lang="en-US" sz="2400" b="0" strike="noStrike" spc="-1" dirty="0" err="1">
+                <a:solidFill>
+                  <a:srgbClr val="17161C"/>
+                </a:solidFill>
+                <a:latin typeface="Codec Pro"/>
+              </a:rPr>
+              <a:t>Überschrift</a:t>
+            </a:r>
+            <a:r>
+              <a:rPr lang="en-US" sz="2400" b="0" strike="noStrike" spc="-1" dirty="0">
+                <a:solidFill>
+                  <a:srgbClr val="17161C"/>
+                </a:solidFill>
+                <a:latin typeface="Codec Pro"/>
+              </a:rPr>
+              <a:t> und </a:t>
+            </a:r>
+            <a:r>
+              <a:rPr lang="en-US" sz="2400" b="0" strike="noStrike" spc="-1" dirty="0" err="1">
+                <a:solidFill>
+                  <a:srgbClr val="17161C"/>
+                </a:solidFill>
+                <a:latin typeface="Codec Pro"/>
+              </a:rPr>
+              <a:t>Erster</a:t>
+            </a:r>
+            <a:r>
+              <a:rPr lang="en-US" sz="2400" b="0" strike="noStrike" spc="-1" dirty="0">
+                <a:solidFill>
+                  <a:srgbClr val="17161C"/>
+                </a:solidFill>
+                <a:latin typeface="Codec Pro"/>
+              </a:rPr>
+              <a:t> Schritt </a:t>
+            </a:r>
+            <a:r>
+              <a:rPr lang="en-US" sz="2400" b="0" strike="noStrike" spc="-1" dirty="0" err="1">
+                <a:solidFill>
+                  <a:srgbClr val="17161C"/>
+                </a:solidFill>
+                <a:latin typeface="Codec Pro"/>
+              </a:rPr>
+              <a:t>stehen</a:t>
+            </a:r>
+            <a:r>
+              <a:rPr lang="en-US" sz="2400" b="0" strike="noStrike" spc="-1" dirty="0">
+                <a:solidFill>
+                  <a:srgbClr val="17161C"/>
+                </a:solidFill>
+                <a:latin typeface="Codec Pro"/>
+              </a:rPr>
+              <a:t> auf </a:t>
+            </a:r>
+            <a:r>
+              <a:rPr lang="en-US" sz="2400" b="0" strike="noStrike" spc="-1" dirty="0" err="1">
+                <a:solidFill>
+                  <a:srgbClr val="17161C"/>
+                </a:solidFill>
+                <a:latin typeface="Codec Pro"/>
+              </a:rPr>
+              <a:t>vorheriger</a:t>
+            </a:r>
+            <a:r>
+              <a:rPr lang="en-US" sz="2400" b="0" strike="noStrike" spc="-1" dirty="0">
+                <a:solidFill>
+                  <a:srgbClr val="17161C"/>
+                </a:solidFill>
+                <a:latin typeface="Codec Pro"/>
+              </a:rPr>
+              <a:t> </a:t>
+            </a:r>
+            <a:r>
+              <a:rPr lang="en-US" sz="2400" b="0" strike="noStrike" spc="-1" dirty="0" err="1">
+                <a:solidFill>
+                  <a:srgbClr val="17161C"/>
+                </a:solidFill>
+                <a:latin typeface="Codec Pro"/>
+              </a:rPr>
+              <a:t>Seite</a:t>
+            </a:r>
+            <a:r>
+              <a:rPr lang="en-US" sz="2400" spc="-1" dirty="0">
+                <a:solidFill>
+                  <a:srgbClr val="17161C"/>
+                </a:solidFill>
+                <a:latin typeface="Codec Pro"/>
+              </a:rPr>
+              <a:t>.</a:t>
+            </a:r>
+            <a:endParaRPr lang="de-DE" sz="2400" b="0" strike="noStrike" spc="-1" dirty="0">
               <a:solidFill>
                 <a:srgbClr val="000000"/>
               </a:solidFill>
@@ -6587,19 +7608,18 @@
       </p:sp>
       <p:pic>
         <p:nvPicPr>
-          <p:cNvPr id="82" name="Grafik 81"/>
+          <p:cNvPr id="98" name="Grafik 97"/>
           <p:cNvPicPr/>
           <p:nvPr/>
         </p:nvPicPr>
         <p:blipFill>
           <a:blip r:embed="rId4"/>
-          <a:srcRect b="76372"/>
           <a:stretch/>
         </p:blipFill>
         <p:spPr>
           <a:xfrm>
-            <a:off x="371160" y="3960000"/>
-            <a:ext cx="6648840" cy="1079640"/>
+            <a:off x="1190618" y="4454821"/>
+            <a:ext cx="7153560" cy="4543560"/>
           </a:xfrm>
           <a:prstGeom prst="rect">
             <a:avLst/>
@@ -6607,52 +7627,13 @@
           <a:ln w="0">
             <a:noFill/>
           </a:ln>
-        </p:spPr>
-      </p:pic>
-      <p:pic>
-        <p:nvPicPr>
-          <p:cNvPr id="83" name="Grafik 82"/>
-          <p:cNvPicPr/>
-          <p:nvPr/>
-        </p:nvPicPr>
-        <p:blipFill>
-          <a:blip r:embed="rId5"/>
-          <a:stretch/>
-        </p:blipFill>
-        <p:spPr>
-          <a:xfrm>
-            <a:off x="360000" y="6039360"/>
-            <a:ext cx="6687000" cy="980640"/>
-          </a:xfrm>
-          <a:prstGeom prst="rect">
-            <a:avLst/>
-          </a:prstGeom>
-          <a:ln w="0">
-            <a:noFill/>
-          </a:ln>
-        </p:spPr>
-      </p:pic>
-      <p:pic>
-        <p:nvPicPr>
-          <p:cNvPr id="84" name="Grafik 83"/>
-          <p:cNvPicPr/>
-          <p:nvPr/>
-        </p:nvPicPr>
-        <p:blipFill>
-          <a:blip r:embed="rId6"/>
-          <a:stretch/>
-        </p:blipFill>
-        <p:spPr>
-          <a:xfrm>
-            <a:off x="720000" y="7560000"/>
-            <a:ext cx="6639480" cy="818640"/>
-          </a:xfrm>
-          <a:prstGeom prst="rect">
-            <a:avLst/>
-          </a:prstGeom>
-          <a:ln w="0">
-            <a:noFill/>
-          </a:ln>
+          <a:effectLst>
+            <a:outerShdw blurRad="50800" dist="38100" dir="2700000" algn="tl" rotWithShape="0">
+              <a:prstClr val="black">
+                <a:alpha val="40000"/>
+              </a:prstClr>
+            </a:outerShdw>
+          </a:effectLst>
         </p:spPr>
       </p:pic>
     </p:spTree>
@@ -6663,7 +7644,7 @@
 </p:sld>
 </file>
 
-<file path=ppt/slides/slide7.xml><?xml version="1.0" encoding="utf-8"?>
+<file path=ppt/slides/slide8.xml><?xml version="1.0" encoding="utf-8"?>
 <p:sld xmlns:a="http://schemas.openxmlformats.org/drawingml/2006/main" xmlns:r="http://schemas.openxmlformats.org/officeDocument/2006/relationships" xmlns:p="http://schemas.openxmlformats.org/presentationml/2006/main">
   <p:cSld>
     <p:bg>
@@ -6690,7 +7671,7 @@
       </p:grpSpPr>
       <p:sp>
         <p:nvSpPr>
-          <p:cNvPr id="85" name="AutoShape 6"/>
+          <p:cNvPr id="99" name="AutoShape 8"/>
           <p:cNvSpPr/>
           <p:nvPr/>
         </p:nvSpPr>
@@ -6738,7 +7719,7 @@
       </p:sp>
       <p:sp>
         <p:nvSpPr>
-          <p:cNvPr id="86" name="Freeform 12"/>
+          <p:cNvPr id="100" name="Freeform 16"/>
           <p:cNvSpPr/>
           <p:nvPr/>
         </p:nvSpPr>
@@ -6817,7 +7798,7 @@
       </p:sp>
       <p:sp>
         <p:nvSpPr>
-          <p:cNvPr id="87" name="Freeform 13"/>
+          <p:cNvPr id="101" name="Freeform 17"/>
           <p:cNvSpPr/>
           <p:nvPr/>
         </p:nvSpPr>
@@ -6896,14 +7877,14 @@
       </p:sp>
       <p:sp>
         <p:nvSpPr>
-          <p:cNvPr id="88" name="TextBox 17"/>
+          <p:cNvPr id="102" name="TextBox 23"/>
           <p:cNvSpPr/>
           <p:nvPr/>
         </p:nvSpPr>
         <p:spPr>
           <a:xfrm>
             <a:off x="1367640" y="3240000"/>
-            <a:ext cx="5652360" cy="320400"/>
+            <a:ext cx="5652360" cy="299569"/>
           </a:xfrm>
           <a:prstGeom prst="rect">
             <a:avLst/>
@@ -6937,15 +7918,42 @@
               </a:lnSpc>
             </a:pPr>
             <a:r>
-              <a:rPr lang="en-US" sz="1800" b="0" strike="noStrike" spc="-1">
-                <a:solidFill>
-                  <a:srgbClr val="17161C"/>
-                </a:solidFill>
-                <a:latin typeface="Codec Pro"/>
-              </a:rPr>
-              <a:t>Wie kann man es besser machen</a:t>
-            </a:r>
-            <a:endParaRPr lang="de-DE" sz="1800" b="0" strike="noStrike" spc="-1">
+              <a:rPr lang="en-US" sz="1800" b="0" strike="noStrike" spc="-1" dirty="0" err="1">
+                <a:solidFill>
+                  <a:srgbClr val="17161C"/>
+                </a:solidFill>
+                <a:latin typeface="Codec Pro"/>
+              </a:rPr>
+              <a:t>Möglicherweise</a:t>
+            </a:r>
+            <a:r>
+              <a:rPr lang="en-US" sz="1800" b="0" strike="noStrike" spc="-1" dirty="0">
+                <a:solidFill>
+                  <a:srgbClr val="17161C"/>
+                </a:solidFill>
+                <a:latin typeface="Codec Pro"/>
+              </a:rPr>
+              <a:t> </a:t>
+            </a:r>
+            <a:r>
+              <a:rPr lang="en-US" sz="1800" b="0" strike="noStrike" spc="-1" dirty="0" err="1">
+                <a:solidFill>
+                  <a:srgbClr val="17161C"/>
+                </a:solidFill>
+                <a:latin typeface="Codec Pro"/>
+              </a:rPr>
+              <a:t>ersetzbar</a:t>
+            </a:r>
+            <a:r>
+              <a:rPr lang="en-US" sz="1800" b="0" strike="noStrike" spc="-1" dirty="0">
+                <a:solidFill>
+                  <a:srgbClr val="17161C"/>
+                </a:solidFill>
+                <a:latin typeface="Codec Pro"/>
+              </a:rPr>
+              <a:t>?</a:t>
+            </a:r>
+            <a:endParaRPr lang="de-DE" sz="1800" b="0" strike="noStrike" spc="-1" dirty="0">
               <a:solidFill>
                 <a:srgbClr val="000000"/>
               </a:solidFill>
@@ -6956,7 +7964,7 @@
       </p:sp>
       <p:sp>
         <p:nvSpPr>
-          <p:cNvPr id="89" name="TextBox 18"/>
+          <p:cNvPr id="103" name="TextBox 24"/>
           <p:cNvSpPr/>
           <p:nvPr/>
         </p:nvSpPr>
@@ -6997,15 +8005,15 @@
               </a:lnSpc>
             </a:pPr>
             <a:r>
-              <a:rPr lang="en-US" sz="8000" b="0" strike="noStrike" spc="-1">
-                <a:solidFill>
-                  <a:srgbClr val="17161C"/>
-                </a:solidFill>
-                <a:latin typeface="Codec Pro"/>
-              </a:rPr>
-              <a:t>Textfehler</a:t>
-            </a:r>
-            <a:endParaRPr lang="de-DE" sz="8000" b="0" strike="noStrike" spc="-1">
+              <a:rPr lang="en-US" sz="8000" b="0" strike="noStrike" spc="-1" dirty="0">
+                <a:solidFill>
+                  <a:srgbClr val="17161C"/>
+                </a:solidFill>
+                <a:latin typeface="Codec Pro"/>
+              </a:rPr>
+              <a:t>Text</a:t>
+            </a:r>
+            <a:endParaRPr lang="de-DE" sz="8000" b="0" strike="noStrike" spc="-1" dirty="0">
               <a:solidFill>
                 <a:srgbClr val="000000"/>
               </a:solidFill>
@@ -7016,14 +8024,14 @@
       </p:sp>
       <p:sp>
         <p:nvSpPr>
-          <p:cNvPr id="90" name="TextBox 19"/>
+          <p:cNvPr id="104" name="TextBox 25"/>
           <p:cNvSpPr/>
           <p:nvPr/>
         </p:nvSpPr>
         <p:spPr>
           <a:xfrm>
             <a:off x="1028880" y="2435760"/>
-            <a:ext cx="8499600" cy="426960"/>
+            <a:ext cx="8499600" cy="405880"/>
           </a:xfrm>
           <a:prstGeom prst="rect">
             <a:avLst/>
@@ -7057,15 +8065,15 @@
               </a:lnSpc>
             </a:pPr>
             <a:r>
-              <a:rPr lang="en-US" sz="2400" b="0" strike="noStrike" spc="-1">
-                <a:solidFill>
-                  <a:srgbClr val="17161C"/>
-                </a:solidFill>
-                <a:latin typeface="Codec Pro"/>
-              </a:rPr>
-              <a:t>Beschreibung was falsch gelaufen ist</a:t>
-            </a:r>
-            <a:endParaRPr lang="de-DE" sz="2400" b="0" strike="noStrike" spc="-1">
+              <a:rPr lang="en-US" sz="2400" b="0" strike="noStrike" spc="-1" dirty="0" err="1">
+                <a:solidFill>
+                  <a:srgbClr val="17161C"/>
+                </a:solidFill>
+                <a:latin typeface="Codec Pro"/>
+              </a:rPr>
+              <a:t>Fülltext</a:t>
+            </a:r>
+            <a:endParaRPr lang="de-DE" sz="2400" b="0" strike="noStrike" spc="-1" dirty="0">
               <a:solidFill>
                 <a:srgbClr val="000000"/>
               </a:solidFill>
@@ -7076,7 +8084,7 @@
       </p:sp>
       <p:pic>
         <p:nvPicPr>
-          <p:cNvPr id="91" name="Grafik 90"/>
+          <p:cNvPr id="105" name="Grafik 104"/>
           <p:cNvPicPr/>
           <p:nvPr/>
         </p:nvPicPr>
@@ -7086,8 +8094,8 @@
         </p:blipFill>
         <p:spPr>
           <a:xfrm>
-            <a:off x="364680" y="3960000"/>
-            <a:ext cx="5035320" cy="5760000"/>
+            <a:off x="275133" y="4270438"/>
+            <a:ext cx="4817105" cy="3359996"/>
           </a:xfrm>
           <a:prstGeom prst="rect">
             <a:avLst/>
@@ -7095,6 +8103,73 @@
           <a:ln w="0">
             <a:noFill/>
           </a:ln>
+          <a:effectLst>
+            <a:outerShdw blurRad="50800" dist="38100" dir="2700000" algn="tl" rotWithShape="0">
+              <a:prstClr val="black">
+                <a:alpha val="40000"/>
+              </a:prstClr>
+            </a:outerShdw>
+          </a:effectLst>
+        </p:spPr>
+      </p:pic>
+      <p:pic>
+        <p:nvPicPr>
+          <p:cNvPr id="3" name="Grafik 2">
+            <a:extLst>
+              <a:ext uri="{FF2B5EF4-FFF2-40B4-BE49-F238E27FC236}">
+                <a16:creationId xmlns:a16="http://schemas.microsoft.com/office/drawing/2014/main" id="{DC655DBA-B494-9632-D796-699073A03725}"/>
+              </a:ext>
+            </a:extLst>
+          </p:cNvPr>
+          <p:cNvPicPr>
+            <a:picLocks noChangeAspect="1"/>
+          </p:cNvPicPr>
+          <p:nvPr/>
+        </p:nvPicPr>
+        <p:blipFill>
+          <a:blip r:embed="rId5"/>
+          <a:stretch>
+            <a:fillRect/>
+          </a:stretch>
+        </p:blipFill>
+        <p:spPr>
+          <a:xfrm>
+            <a:off x="5652938" y="3389784"/>
+            <a:ext cx="4745122" cy="3200757"/>
+          </a:xfrm>
+          <a:prstGeom prst="rect">
+            <a:avLst/>
+          </a:prstGeom>
+        </p:spPr>
+      </p:pic>
+      <p:pic>
+        <p:nvPicPr>
+          <p:cNvPr id="5" name="Grafik 4">
+            <a:extLst>
+              <a:ext uri="{FF2B5EF4-FFF2-40B4-BE49-F238E27FC236}">
+                <a16:creationId xmlns:a16="http://schemas.microsoft.com/office/drawing/2014/main" id="{275F2624-7E48-1C90-A97D-FB23D2316FA5}"/>
+              </a:ext>
+            </a:extLst>
+          </p:cNvPr>
+          <p:cNvPicPr>
+            <a:picLocks noChangeAspect="1"/>
+          </p:cNvPicPr>
+          <p:nvPr/>
+        </p:nvPicPr>
+        <p:blipFill>
+          <a:blip r:embed="rId6"/>
+          <a:stretch>
+            <a:fillRect/>
+          </a:stretch>
+        </p:blipFill>
+        <p:spPr>
+          <a:xfrm>
+            <a:off x="5649067" y="6950785"/>
+            <a:ext cx="4748993" cy="3200757"/>
+          </a:xfrm>
+          <a:prstGeom prst="rect">
+            <a:avLst/>
+          </a:prstGeom>
         </p:spPr>
       </p:pic>
     </p:spTree>
@@ -7105,7 +8180,7 @@
 </p:sld>
 </file>
 
-<file path=ppt/slides/slide8.xml><?xml version="1.0" encoding="utf-8"?>
+<file path=ppt/slides/slide9.xml><?xml version="1.0" encoding="utf-8"?>
 <p:sld xmlns:a="http://schemas.openxmlformats.org/drawingml/2006/main" xmlns:r="http://schemas.openxmlformats.org/officeDocument/2006/relationships" xmlns:p="http://schemas.openxmlformats.org/presentationml/2006/main">
   <p:cSld>
     <p:bg>
@@ -7132,7 +8207,7 @@
       </p:grpSpPr>
       <p:sp>
         <p:nvSpPr>
-          <p:cNvPr id="92" name="AutoShape 7"/>
+          <p:cNvPr id="106" name="AutoShape 9"/>
           <p:cNvSpPr/>
           <p:nvPr/>
         </p:nvSpPr>
@@ -7180,7 +8255,7 @@
       </p:sp>
       <p:sp>
         <p:nvSpPr>
-          <p:cNvPr id="93" name="Freeform 14"/>
+          <p:cNvPr id="107" name="Freeform 18"/>
           <p:cNvSpPr/>
           <p:nvPr/>
         </p:nvSpPr>
@@ -7259,7 +8334,7 @@
       </p:sp>
       <p:sp>
         <p:nvSpPr>
-          <p:cNvPr id="94" name="Freeform 15"/>
+          <p:cNvPr id="108" name="Freeform 19"/>
           <p:cNvSpPr/>
           <p:nvPr/>
         </p:nvSpPr>
@@ -7338,14 +8413,14 @@
       </p:sp>
       <p:sp>
         <p:nvSpPr>
-          <p:cNvPr id="95" name="TextBox 20"/>
+          <p:cNvPr id="109" name="TextBox 26"/>
           <p:cNvSpPr/>
           <p:nvPr/>
         </p:nvSpPr>
         <p:spPr>
           <a:xfrm>
-            <a:off x="1367640" y="3240000"/>
-            <a:ext cx="5652360" cy="320400"/>
+            <a:off x="1367639" y="3240000"/>
+            <a:ext cx="5960521" cy="299569"/>
           </a:xfrm>
           <a:prstGeom prst="rect">
             <a:avLst/>
@@ -7368,7 +8443,7 @@
           <a:fontRef idx="minor"/>
         </p:style>
         <p:txBody>
-          <a:bodyPr lIns="0" tIns="0" rIns="0" bIns="0" anchor="t">
+          <a:bodyPr wrap="square" lIns="0" tIns="0" rIns="0" bIns="0" anchor="t">
             <a:spAutoFit/>
           </a:bodyPr>
           <a:lstStyle/>
@@ -7379,15 +8454,114 @@
               </a:lnSpc>
             </a:pPr>
             <a:r>
-              <a:rPr lang="en-US" sz="1800" b="0" strike="noStrike" spc="-1">
-                <a:solidFill>
-                  <a:srgbClr val="17161C"/>
-                </a:solidFill>
-                <a:latin typeface="Codec Pro"/>
-              </a:rPr>
-              <a:t>Wie kann man es besser machen</a:t>
-            </a:r>
-            <a:endParaRPr lang="de-DE" sz="1800" b="0" strike="noStrike" spc="-1">
+              <a:rPr lang="en-US" sz="1800" b="0" strike="noStrike" spc="-1" dirty="0" err="1">
+                <a:solidFill>
+                  <a:srgbClr val="17161C"/>
+                </a:solidFill>
+                <a:latin typeface="Codec Pro"/>
+              </a:rPr>
+              <a:t>Gibt</a:t>
+            </a:r>
+            <a:r>
+              <a:rPr lang="en-US" sz="1800" b="0" strike="noStrike" spc="-1" dirty="0">
+                <a:solidFill>
+                  <a:srgbClr val="17161C"/>
+                </a:solidFill>
+                <a:latin typeface="Codec Pro"/>
+              </a:rPr>
+              <a:t> es </a:t>
+            </a:r>
+            <a:r>
+              <a:rPr lang="en-US" sz="1800" b="0" strike="noStrike" spc="-1" dirty="0" err="1">
+                <a:solidFill>
+                  <a:srgbClr val="17161C"/>
+                </a:solidFill>
+                <a:latin typeface="Codec Pro"/>
+              </a:rPr>
+              <a:t>keine</a:t>
+            </a:r>
+            <a:r>
+              <a:rPr lang="en-US" sz="1800" b="0" strike="noStrike" spc="-1" dirty="0">
+                <a:solidFill>
+                  <a:srgbClr val="17161C"/>
+                </a:solidFill>
+                <a:latin typeface="Codec Pro"/>
+              </a:rPr>
+              <a:t> max. </a:t>
+            </a:r>
+            <a:r>
+              <a:rPr lang="en-US" sz="1800" b="0" strike="noStrike" spc="-1" dirty="0" err="1">
+                <a:solidFill>
+                  <a:srgbClr val="17161C"/>
+                </a:solidFill>
+                <a:latin typeface="Codec Pro"/>
+              </a:rPr>
+              <a:t>Geschwindigkeit</a:t>
+            </a:r>
+            <a:r>
+              <a:rPr lang="en-US" sz="1800" b="0" strike="noStrike" spc="-1" dirty="0">
+                <a:solidFill>
+                  <a:srgbClr val="17161C"/>
+                </a:solidFill>
+                <a:latin typeface="Codec Pro"/>
+              </a:rPr>
+              <a:t> </a:t>
+            </a:r>
+            <a:r>
+              <a:rPr lang="en-US" sz="1800" b="0" strike="noStrike" spc="-1" dirty="0" err="1">
+                <a:solidFill>
+                  <a:srgbClr val="17161C"/>
+                </a:solidFill>
+                <a:latin typeface="Codec Pro"/>
+              </a:rPr>
+              <a:t>bei</a:t>
+            </a:r>
+            <a:r>
+              <a:rPr lang="en-US" sz="1800" b="0" strike="noStrike" spc="-1" dirty="0">
+                <a:solidFill>
+                  <a:srgbClr val="17161C"/>
+                </a:solidFill>
+                <a:latin typeface="Codec Pro"/>
+              </a:rPr>
+              <a:t> </a:t>
+            </a:r>
+            <a:r>
+              <a:rPr lang="en-US" sz="1800" b="0" strike="noStrike" spc="-1" dirty="0" err="1">
+                <a:solidFill>
+                  <a:srgbClr val="17161C"/>
+                </a:solidFill>
+                <a:latin typeface="Codec Pro"/>
+              </a:rPr>
+              <a:t>aktiviertem</a:t>
+            </a:r>
+            <a:r>
+              <a:rPr lang="en-US" sz="1800" b="0" strike="noStrike" spc="-1" dirty="0">
+                <a:solidFill>
+                  <a:srgbClr val="17161C"/>
+                </a:solidFill>
+                <a:latin typeface="Codec Pro"/>
+              </a:rPr>
+              <a:t> </a:t>
+            </a:r>
+            <a:r>
+              <a:rPr lang="en-US" sz="1800" b="0" strike="noStrike" spc="-1" dirty="0" err="1">
+                <a:solidFill>
+                  <a:srgbClr val="17161C"/>
+                </a:solidFill>
+                <a:latin typeface="Codec Pro"/>
+              </a:rPr>
+              <a:t>Fastmode</a:t>
+            </a:r>
+            <a:r>
+              <a:rPr lang="en-US" sz="1800" b="0" strike="noStrike" spc="-1" dirty="0">
+                <a:solidFill>
+                  <a:srgbClr val="17161C"/>
+                </a:solidFill>
+                <a:latin typeface="Codec Pro"/>
+              </a:rPr>
+              <a:t>?</a:t>
+            </a:r>
+            <a:endParaRPr lang="de-DE" sz="1800" b="0" strike="noStrike" spc="-1" dirty="0">
               <a:solidFill>
                 <a:srgbClr val="000000"/>
               </a:solidFill>
@@ -7398,7 +8572,7 @@
       </p:sp>
       <p:sp>
         <p:nvSpPr>
-          <p:cNvPr id="96" name="TextBox 21"/>
+          <p:cNvPr id="110" name="TextBox 27"/>
           <p:cNvSpPr/>
           <p:nvPr/>
         </p:nvSpPr>
@@ -7445,9 +8619,9 @@
                 </a:solidFill>
                 <a:latin typeface="Codec Pro"/>
               </a:rPr>
-              <a:t>Textfehler</a:t>
-            </a:r>
-            <a:endParaRPr lang="de-DE" sz="8000" b="0" strike="noStrike" spc="-1">
+              <a:t>Text</a:t>
+            </a:r>
+            <a:endParaRPr lang="de-DE" sz="8000" b="0" strike="noStrike" spc="-1" dirty="0">
               <a:solidFill>
                 <a:srgbClr val="000000"/>
               </a:solidFill>
@@ -7458,14 +8632,14 @@
       </p:sp>
       <p:sp>
         <p:nvSpPr>
-          <p:cNvPr id="97" name="TextBox 22"/>
+          <p:cNvPr id="111" name="TextBox 28"/>
           <p:cNvSpPr/>
           <p:nvPr/>
         </p:nvSpPr>
         <p:spPr>
           <a:xfrm>
             <a:off x="1028880" y="2435760"/>
-            <a:ext cx="8499600" cy="426960"/>
+            <a:ext cx="8499600" cy="405880"/>
           </a:xfrm>
           <a:prstGeom prst="rect">
             <a:avLst/>
@@ -7499,15 +8673,42 @@
               </a:lnSpc>
             </a:pPr>
             <a:r>
-              <a:rPr lang="en-US" sz="2400" b="0" strike="noStrike" spc="-1">
-                <a:solidFill>
-                  <a:srgbClr val="17161C"/>
-                </a:solidFill>
-                <a:latin typeface="Codec Pro"/>
-              </a:rPr>
-              <a:t>Beschreibung was falsch gelaufen ist</a:t>
-            </a:r>
-            <a:endParaRPr lang="de-DE" sz="2400" b="0" strike="noStrike" spc="-1">
+              <a:rPr lang="en-US" sz="2400" b="0" strike="noStrike" spc="-1" dirty="0" err="1">
+                <a:solidFill>
+                  <a:srgbClr val="17161C"/>
+                </a:solidFill>
+                <a:latin typeface="Codec Pro"/>
+              </a:rPr>
+              <a:t>Fehlende</a:t>
+            </a:r>
+            <a:r>
+              <a:rPr lang="en-US" sz="2400" b="0" strike="noStrike" spc="-1" dirty="0">
+                <a:solidFill>
+                  <a:srgbClr val="17161C"/>
+                </a:solidFill>
+                <a:latin typeface="Codec Pro"/>
+              </a:rPr>
+              <a:t> </a:t>
+            </a:r>
+            <a:r>
+              <a:rPr lang="en-US" sz="2400" b="0" strike="noStrike" spc="-1" dirty="0" err="1">
+                <a:solidFill>
+                  <a:srgbClr val="17161C"/>
+                </a:solidFill>
+                <a:latin typeface="Codec Pro"/>
+              </a:rPr>
+              <a:t>Angabe</a:t>
+            </a:r>
+            <a:r>
+              <a:rPr lang="en-US" sz="2400" b="0" strike="noStrike" spc="-1" dirty="0">
+                <a:solidFill>
+                  <a:srgbClr val="17161C"/>
+                </a:solidFill>
+                <a:latin typeface="Codec Pro"/>
+              </a:rPr>
+              <a:t>?</a:t>
+            </a:r>
+            <a:endParaRPr lang="de-DE" sz="2400" b="0" strike="noStrike" spc="-1" dirty="0">
               <a:solidFill>
                 <a:srgbClr val="000000"/>
               </a:solidFill>
@@ -7518,7 +8719,7 @@
       </p:sp>
       <p:pic>
         <p:nvPicPr>
-          <p:cNvPr id="98" name="Grafik 97"/>
+          <p:cNvPr id="112" name="Grafik 111"/>
           <p:cNvPicPr/>
           <p:nvPr/>
         </p:nvPicPr>
@@ -7528,8 +8729,8 @@
         </p:blipFill>
         <p:spPr>
           <a:xfrm>
-            <a:off x="1440000" y="4500000"/>
-            <a:ext cx="7153560" cy="4543560"/>
+            <a:off x="1367640" y="4860000"/>
+            <a:ext cx="6732360" cy="3603960"/>
           </a:xfrm>
           <a:prstGeom prst="rect">
             <a:avLst/>
@@ -7537,448 +8738,13 @@
           <a:ln w="0">
             <a:noFill/>
           </a:ln>
-        </p:spPr>
-      </p:pic>
-    </p:spTree>
-  </p:cSld>
-  <p:clrMapOvr>
-    <a:masterClrMapping/>
-  </p:clrMapOvr>
-</p:sld>
-</file>
-
-<file path=ppt/slides/slide9.xml><?xml version="1.0" encoding="utf-8"?>
-<p:sld xmlns:a="http://schemas.openxmlformats.org/drawingml/2006/main" xmlns:r="http://schemas.openxmlformats.org/officeDocument/2006/relationships" xmlns:p="http://schemas.openxmlformats.org/presentationml/2006/main">
-  <p:cSld>
-    <p:bg>
-      <p:bgPr>
-        <a:solidFill>
-          <a:srgbClr val="FDFCF3"/>
-        </a:solidFill>
-        <a:effectLst/>
-      </p:bgPr>
-    </p:bg>
-    <p:spTree>
-      <p:nvGrpSpPr>
-        <p:cNvPr id="1" name=""/>
-        <p:cNvGrpSpPr/>
-        <p:nvPr/>
-      </p:nvGrpSpPr>
-      <p:grpSpPr>
-        <a:xfrm>
-          <a:off x="0" y="0"/>
-          <a:ext cx="0" cy="0"/>
-          <a:chOff x="0" y="0"/>
-          <a:chExt cx="0" cy="0"/>
-        </a:xfrm>
-      </p:grpSpPr>
-      <p:sp>
-        <p:nvSpPr>
-          <p:cNvPr id="99" name="AutoShape 8"/>
-          <p:cNvSpPr/>
-          <p:nvPr/>
-        </p:nvSpPr>
-        <p:spPr>
-          <a:xfrm rot="10800000">
-            <a:off x="10960920" y="360"/>
-            <a:ext cx="8759160" cy="10286640"/>
-          </a:xfrm>
-          <a:prstGeom prst="rect">
-            <a:avLst/>
-          </a:prstGeom>
-          <a:solidFill>
-            <a:srgbClr val="0C6980"/>
-          </a:solidFill>
-          <a:ln w="0">
-            <a:noFill/>
-          </a:ln>
-        </p:spPr>
-        <p:style>
-          <a:lnRef idx="0">
-            <a:scrgbClr r="0" g="0" b="0"/>
-          </a:lnRef>
-          <a:fillRef idx="0">
-            <a:scrgbClr r="0" g="0" b="0"/>
-          </a:fillRef>
-          <a:effectRef idx="0">
-            <a:scrgbClr r="0" g="0" b="0"/>
-          </a:effectRef>
-          <a:fontRef idx="minor"/>
-        </p:style>
-        <p:txBody>
-          <a:bodyPr lIns="90000" tIns="45000" rIns="90000" bIns="45000" anchor="t">
-            <a:noAutofit/>
-          </a:bodyPr>
-          <a:lstStyle/>
-          <a:p>
-            <a:endParaRPr lang="de-DE" sz="1800" b="0" strike="noStrike" spc="-1">
-              <a:solidFill>
-                <a:srgbClr val="000000"/>
-              </a:solidFill>
-              <a:latin typeface="Arial"/>
-            </a:endParaRPr>
-          </a:p>
-        </p:txBody>
-      </p:sp>
-      <p:sp>
-        <p:nvSpPr>
-          <p:cNvPr id="100" name="Freeform 16"/>
-          <p:cNvSpPr/>
-          <p:nvPr/>
-        </p:nvSpPr>
-        <p:spPr>
-          <a:xfrm>
-            <a:off x="11773440" y="-714240"/>
-            <a:ext cx="12363120" cy="12250800"/>
-          </a:xfrm>
-          <a:custGeom>
-            <a:avLst/>
-            <a:gdLst>
-              <a:gd name="textAreaLeft" fmla="*/ 0 w 12363120"/>
-              <a:gd name="textAreaRight" fmla="*/ 12363480 w 12363120"/>
-              <a:gd name="textAreaTop" fmla="*/ 0 h 12250800"/>
-              <a:gd name="textAreaBottom" fmla="*/ 12251160 h 12250800"/>
-            </a:gdLst>
-            <a:ahLst/>
-            <a:cxnLst/>
-            <a:rect l="textAreaLeft" t="textAreaTop" r="textAreaRight" b="textAreaBottom"/>
-            <a:pathLst>
-              <a:path w="12363420" h="12251025">
-                <a:moveTo>
-                  <a:pt x="0" y="0"/>
-                </a:moveTo>
-                <a:lnTo>
-                  <a:pt x="12363420" y="0"/>
-                </a:lnTo>
-                <a:lnTo>
-                  <a:pt x="12363420" y="12251025"/>
-                </a:lnTo>
-                <a:lnTo>
-                  <a:pt x="0" y="12251025"/>
-                </a:lnTo>
-                <a:lnTo>
-                  <a:pt x="0" y="0"/>
-                </a:lnTo>
-                <a:close/>
-              </a:path>
-            </a:pathLst>
-          </a:custGeom>
-          <a:blipFill rotWithShape="0">
-            <a:blip r:embed="rId2"/>
-            <a:srcRect/>
-            <a:stretch/>
-          </a:blipFill>
-          <a:ln w="0">
-            <a:noFill/>
-          </a:ln>
-        </p:spPr>
-        <p:style>
-          <a:lnRef idx="0">
-            <a:scrgbClr r="0" g="0" b="0"/>
-          </a:lnRef>
-          <a:fillRef idx="0">
-            <a:scrgbClr r="0" g="0" b="0"/>
-          </a:fillRef>
-          <a:effectRef idx="0">
-            <a:scrgbClr r="0" g="0" b="0"/>
-          </a:effectRef>
-          <a:fontRef idx="minor"/>
-        </p:style>
-        <p:txBody>
-          <a:bodyPr lIns="90000" tIns="45000" rIns="90000" bIns="45000" anchor="t">
-            <a:noAutofit/>
-          </a:bodyPr>
-          <a:lstStyle/>
-          <a:p>
-            <a:endParaRPr lang="de-DE" sz="1800" b="0" strike="noStrike" spc="-1">
-              <a:solidFill>
-                <a:srgbClr val="000000"/>
-              </a:solidFill>
-              <a:latin typeface="Arial"/>
-            </a:endParaRPr>
-          </a:p>
-        </p:txBody>
-      </p:sp>
-      <p:sp>
-        <p:nvSpPr>
-          <p:cNvPr id="101" name="Freeform 17"/>
-          <p:cNvSpPr/>
-          <p:nvPr/>
-        </p:nvSpPr>
-        <p:spPr>
-          <a:xfrm flipH="1">
-            <a:off x="10959840" y="3104640"/>
-            <a:ext cx="5056200" cy="3493440"/>
-          </a:xfrm>
-          <a:custGeom>
-            <a:avLst/>
-            <a:gdLst>
-              <a:gd name="textAreaLeft" fmla="*/ -360 w 5056200"/>
-              <a:gd name="textAreaRight" fmla="*/ 5056200 w 5056200"/>
-              <a:gd name="textAreaTop" fmla="*/ 0 h 3493440"/>
-              <a:gd name="textAreaBottom" fmla="*/ 3493800 h 3493440"/>
-            </a:gdLst>
-            <a:ahLst/>
-            <a:cxnLst/>
-            <a:rect l="textAreaLeft" t="textAreaTop" r="textAreaRight" b="textAreaBottom"/>
-            <a:pathLst>
-              <a:path w="5056689" h="3493713">
-                <a:moveTo>
-                  <a:pt x="5056690" y="0"/>
-                </a:moveTo>
-                <a:lnTo>
-                  <a:pt x="0" y="0"/>
-                </a:lnTo>
-                <a:lnTo>
-                  <a:pt x="0" y="3493713"/>
-                </a:lnTo>
-                <a:lnTo>
-                  <a:pt x="5056690" y="3493713"/>
-                </a:lnTo>
-                <a:lnTo>
-                  <a:pt x="5056690" y="0"/>
-                </a:lnTo>
-                <a:close/>
-              </a:path>
-            </a:pathLst>
-          </a:custGeom>
-          <a:blipFill rotWithShape="0">
-            <a:blip r:embed="rId3"/>
-            <a:srcRect/>
-            <a:stretch/>
-          </a:blipFill>
-          <a:ln w="0">
-            <a:noFill/>
-          </a:ln>
-        </p:spPr>
-        <p:style>
-          <a:lnRef idx="0">
-            <a:scrgbClr r="0" g="0" b="0"/>
-          </a:lnRef>
-          <a:fillRef idx="0">
-            <a:scrgbClr r="0" g="0" b="0"/>
-          </a:fillRef>
-          <a:effectRef idx="0">
-            <a:scrgbClr r="0" g="0" b="0"/>
-          </a:effectRef>
-          <a:fontRef idx="minor"/>
-        </p:style>
-        <p:txBody>
-          <a:bodyPr lIns="90000" tIns="45000" rIns="90000" bIns="45000" anchor="t">
-            <a:noAutofit/>
-          </a:bodyPr>
-          <a:lstStyle/>
-          <a:p>
-            <a:endParaRPr lang="de-DE" sz="1800" b="0" strike="noStrike" spc="-1">
-              <a:solidFill>
-                <a:srgbClr val="000000"/>
-              </a:solidFill>
-              <a:latin typeface="Arial"/>
-            </a:endParaRPr>
-          </a:p>
-        </p:txBody>
-      </p:sp>
-      <p:sp>
-        <p:nvSpPr>
-          <p:cNvPr id="102" name="TextBox 23"/>
-          <p:cNvSpPr/>
-          <p:nvPr/>
-        </p:nvSpPr>
-        <p:spPr>
-          <a:xfrm>
-            <a:off x="1367640" y="3240000"/>
-            <a:ext cx="5652360" cy="320400"/>
-          </a:xfrm>
-          <a:prstGeom prst="rect">
-            <a:avLst/>
-          </a:prstGeom>
-          <a:noFill/>
-          <a:ln w="0">
-            <a:noFill/>
-          </a:ln>
-        </p:spPr>
-        <p:style>
-          <a:lnRef idx="0">
-            <a:scrgbClr r="0" g="0" b="0"/>
-          </a:lnRef>
-          <a:fillRef idx="0">
-            <a:scrgbClr r="0" g="0" b="0"/>
-          </a:fillRef>
-          <a:effectRef idx="0">
-            <a:scrgbClr r="0" g="0" b="0"/>
-          </a:effectRef>
-          <a:fontRef idx="minor"/>
-        </p:style>
-        <p:txBody>
-          <a:bodyPr lIns="0" tIns="0" rIns="0" bIns="0" anchor="t">
-            <a:spAutoFit/>
-          </a:bodyPr>
-          <a:lstStyle/>
-          <a:p>
-            <a:pPr defTabSz="914400">
-              <a:lnSpc>
-                <a:spcPts val="2520"/>
-              </a:lnSpc>
-            </a:pPr>
-            <a:r>
-              <a:rPr lang="en-US" sz="1800" b="0" strike="noStrike" spc="-1">
-                <a:solidFill>
-                  <a:srgbClr val="17161C"/>
-                </a:solidFill>
-                <a:latin typeface="Codec Pro"/>
-              </a:rPr>
-              <a:t>Wie kann man es besser machen</a:t>
-            </a:r>
-            <a:endParaRPr lang="de-DE" sz="1800" b="0" strike="noStrike" spc="-1">
-              <a:solidFill>
-                <a:srgbClr val="000000"/>
-              </a:solidFill>
-              <a:latin typeface="Arial"/>
-            </a:endParaRPr>
-          </a:p>
-        </p:txBody>
-      </p:sp>
-      <p:sp>
-        <p:nvSpPr>
-          <p:cNvPr id="103" name="TextBox 24"/>
-          <p:cNvSpPr/>
-          <p:nvPr/>
-        </p:nvSpPr>
-        <p:spPr>
-          <a:xfrm>
-            <a:off x="1028880" y="895320"/>
-            <a:ext cx="8499600" cy="1219680"/>
-          </a:xfrm>
-          <a:prstGeom prst="rect">
-            <a:avLst/>
-          </a:prstGeom>
-          <a:noFill/>
-          <a:ln w="0">
-            <a:noFill/>
-          </a:ln>
-        </p:spPr>
-        <p:style>
-          <a:lnRef idx="0">
-            <a:scrgbClr r="0" g="0" b="0"/>
-          </a:lnRef>
-          <a:fillRef idx="0">
-            <a:scrgbClr r="0" g="0" b="0"/>
-          </a:fillRef>
-          <a:effectRef idx="0">
-            <a:scrgbClr r="0" g="0" b="0"/>
-          </a:effectRef>
-          <a:fontRef idx="minor"/>
-        </p:style>
-        <p:txBody>
-          <a:bodyPr lIns="0" tIns="0" rIns="0" bIns="0" anchor="t">
-            <a:spAutoFit/>
-          </a:bodyPr>
-          <a:lstStyle/>
-          <a:p>
-            <a:pPr defTabSz="914400">
-              <a:lnSpc>
-                <a:spcPts val="9601"/>
-              </a:lnSpc>
-            </a:pPr>
-            <a:r>
-              <a:rPr lang="en-US" sz="8000" b="0" strike="noStrike" spc="-1">
-                <a:solidFill>
-                  <a:srgbClr val="17161C"/>
-                </a:solidFill>
-                <a:latin typeface="Codec Pro"/>
-              </a:rPr>
-              <a:t>Textfehler</a:t>
-            </a:r>
-            <a:endParaRPr lang="de-DE" sz="8000" b="0" strike="noStrike" spc="-1">
-              <a:solidFill>
-                <a:srgbClr val="000000"/>
-              </a:solidFill>
-              <a:latin typeface="Arial"/>
-            </a:endParaRPr>
-          </a:p>
-        </p:txBody>
-      </p:sp>
-      <p:sp>
-        <p:nvSpPr>
-          <p:cNvPr id="104" name="TextBox 25"/>
-          <p:cNvSpPr/>
-          <p:nvPr/>
-        </p:nvSpPr>
-        <p:spPr>
-          <a:xfrm>
-            <a:off x="1028880" y="2435760"/>
-            <a:ext cx="8499600" cy="426960"/>
-          </a:xfrm>
-          <a:prstGeom prst="rect">
-            <a:avLst/>
-          </a:prstGeom>
-          <a:noFill/>
-          <a:ln w="0">
-            <a:noFill/>
-          </a:ln>
-        </p:spPr>
-        <p:style>
-          <a:lnRef idx="0">
-            <a:scrgbClr r="0" g="0" b="0"/>
-          </a:lnRef>
-          <a:fillRef idx="0">
-            <a:scrgbClr r="0" g="0" b="0"/>
-          </a:fillRef>
-          <a:effectRef idx="0">
-            <a:scrgbClr r="0" g="0" b="0"/>
-          </a:effectRef>
-          <a:fontRef idx="minor"/>
-        </p:style>
-        <p:txBody>
-          <a:bodyPr lIns="0" tIns="0" rIns="0" bIns="0" anchor="t">
-            <a:spAutoFit/>
-          </a:bodyPr>
-          <a:lstStyle/>
-          <a:p>
-            <a:pPr defTabSz="914400">
-              <a:lnSpc>
-                <a:spcPts val="3359"/>
-              </a:lnSpc>
-            </a:pPr>
-            <a:r>
-              <a:rPr lang="en-US" sz="2400" b="0" strike="noStrike" spc="-1">
-                <a:solidFill>
-                  <a:srgbClr val="17161C"/>
-                </a:solidFill>
-                <a:latin typeface="Codec Pro"/>
-              </a:rPr>
-              <a:t>Beschreibung was falsch gelaufen ist</a:t>
-            </a:r>
-            <a:endParaRPr lang="de-DE" sz="2400" b="0" strike="noStrike" spc="-1">
-              <a:solidFill>
-                <a:srgbClr val="000000"/>
-              </a:solidFill>
-              <a:latin typeface="Arial"/>
-            </a:endParaRPr>
-          </a:p>
-        </p:txBody>
-      </p:sp>
-      <p:pic>
-        <p:nvPicPr>
-          <p:cNvPr id="105" name="Grafik 104"/>
-          <p:cNvPicPr/>
-          <p:nvPr/>
-        </p:nvPicPr>
-        <p:blipFill>
-          <a:blip r:embed="rId4"/>
-          <a:stretch/>
-        </p:blipFill>
-        <p:spPr>
-          <a:xfrm>
-            <a:off x="1620000" y="4354560"/>
-            <a:ext cx="6660000" cy="4645440"/>
-          </a:xfrm>
-          <a:prstGeom prst="rect">
-            <a:avLst/>
-          </a:prstGeom>
-          <a:ln w="0">
-            <a:noFill/>
-          </a:ln>
+          <a:effectLst>
+            <a:outerShdw blurRad="50800" dist="38100" dir="2700000" algn="tl" rotWithShape="0">
+              <a:prstClr val="black">
+                <a:alpha val="40000"/>
+              </a:prstClr>
+            </a:outerShdw>
+          </a:effectLst>
         </p:spPr>
       </p:pic>
     </p:spTree>

</xml_diff>